<commit_message>
fix: market-agnostic analysis engine — 8 cross-market bugs fixed
1. $APPEALS scores: auto-detect 1-10 vs 1-100 scale (Chile was 0.3→3.5/5)
2. Hardcoded "German telecom market" → dynamic market_config.market_name
3. Hardcoded "EUR" currency → market_config.currency (6 files)
4. Competitor scores scale normalization (same auto-detect)
5. SWOT posture: market leaders (>35% share) no longer WT-dominant
6. Intelligence event dedup by title (Germany had 3x duplicates)
7. Strength derivation: EBITDA threshold 35%→28%, +market share criterion
8. Dimension name case normalization (pricing_competitiveness dupes)

All fixes apply automatically to any new market added in future.

Co-Authored-By: Claude Opus 4.6 <noreply@anthropic.com>
</commit_message>
<xml_diff>
--- a/reports/chile/entel_cl/CQ4_2025/blm_entel_cl_analysis_cq4_2025.pptx
+++ b/reports/chile/entel_cl/CQ4_2025/blm_entel_cl_analysis_cq4_2025.pptx
@@ -4594,7 +4594,7 @@
               </a:defRPr>
             </a:pPr>
             <a:r>
-              <a:t>Key Message: German telecom market totals EUR 1391000.0M in quarterly revenue; entel_cl holds 58.3% market share; gaps in Price, Availability; Market presents a balanced mix of opportunities and challenges.</a:t>
+              <a:t>Key Message: Chile telecom market totals CLP 1391000.0M in quarterly revenue; entel_cl holds 58.3% market share; competitive strengths in Availability, Performance; Market presents a balanced mix of opportunities and challenges.</a:t>
             </a:r>
           </a:p>
         </p:txBody>
@@ -5470,7 +5470,7 @@
               </a:defRPr>
             </a:pPr>
             <a:r>
-              <a:t>Key Message: German telecom market totals EUR 1391000.0M in quarterly revenue; entel_cl holds 58.3% market share; gaps in Price, Availability; Market presents a balanced mix of opportunities and challenges.</a:t>
+              <a:t>Key Message: Chile telecom market totals CLP 1391000.0M in quarterly revenue; entel_cl holds 58.3% market share; competitive strengths in Availability, Performance; Market presents a balanced mix of opportunities and challenges.</a:t>
             </a:r>
           </a:p>
         </p:txBody>
@@ -5742,7 +5742,7 @@
               </a:defRPr>
             </a:pPr>
             <a:r>
-              <a:t>Key Message: German telecom market totals EUR 1391000.0M in quarterly revenue; entel_cl holds 58.3% market share; gaps in Price, Availability; Market presents a balanced mix of opportunities and challenges.</a:t>
+              <a:t>Key Message: Chile telecom market totals CLP 1391000.0M in quarterly revenue; entel_cl holds 58.3% market share; competitive strengths in Availability, Performance; Market presents a balanced mix of opportunities and challenges.</a:t>
             </a:r>
           </a:p>
         </p:txBody>
@@ -6272,7 +6272,7 @@
               </a:defRPr>
             </a:pPr>
             <a:r>
-              <a:t>Key Message: German telecom market totals EUR 1391000.0M in quarterly revenue; entel_cl holds 58.3% market share; gaps in Price, Availability; Market presents a balanced mix of opportunities and challenges.</a:t>
+              <a:t>Key Message: Chile telecom market totals CLP 1391000.0M in quarterly revenue; entel_cl holds 58.3% market share; competitive strengths in Availability, Performance; Market presents a balanced mix of opportunities and challenges.</a:t>
             </a:r>
           </a:p>
         </p:txBody>
@@ -14492,7 +14492,7 @@
               </a:defRPr>
             </a:pPr>
             <a:r>
-              <a:t>Key Message: Ranked #1 of 5 operators in market; revenue EUR 811000.0M; EBITDA margin 30.0%; overall healthy operations; key strength: Revenue on growth trajectory; key challenge: 5G coverage gap at only 65.0%; Management outlook: FY2025 total revenue CLP 2.1T (+4.2% YoY). EBITDA margin improved to 32.8% (+0.7pp). Management reaffirms FY2026 guidanc</a:t>
+              <a:t>Key Message: Ranked #1 of 5 operators in market; revenue EUR 811000.0M; EBITDA margin 30.0%; overall healthy operations; key strength: 5G Deployment; key challenge: Pricing Competitiveness; Management outlook: FY2025 total revenue CLP 2.1T (+4.2% YoY). EBITDA margin improved to 32.8% (+0.7pp). Management reaffirms FY2026 guidanc</a:t>
             </a:r>
           </a:p>
         </p:txBody>
@@ -20274,7 +20274,7 @@
               </a:defRPr>
             </a:pPr>
             <a:r>
-              <a:t>• Revenue on growth trajectory</a:t>
+              <a:t>• 5G Deployment: score 80 (market avg 65</a:t>
             </a:r>
           </a:p>
           <a:p>
@@ -20290,68 +20290,9 @@
               </a:defRPr>
             </a:pPr>
             <a:r>
-              <a:t>• Top 1 in revenue market ranking</a:t>
-            </a:r>
-          </a:p>
-        </p:txBody>
-      </p:sp>
-      <p:sp>
-        <p:nvSpPr>
-          <p:cNvPr id="8" name="TextBox 7"/>
-          <p:cNvSpPr txBox="1"/>
-          <p:nvPr/>
-        </p:nvSpPr>
-        <p:spPr>
-          <a:xfrm>
-            <a:off x="4114800" y="1280160"/>
-            <a:ext cx="3474720" cy="274320"/>
-          </a:xfrm>
-          <a:prstGeom prst="rect">
-            <a:avLst/>
-          </a:prstGeom>
-          <a:noFill/>
-        </p:spPr>
-        <p:txBody>
-          <a:bodyPr wrap="square">
-            <a:spAutoFit/>
-          </a:bodyPr>
-          <a:lstStyle/>
-          <a:p>
-            <a:pPr algn="l">
-              <a:defRPr sz="1300" b="1">
-                <a:solidFill>
-                  <a:srgbClr val="C80000"/>
-                </a:solidFill>
-                <a:latin typeface="Arial"/>
-              </a:defRPr>
-            </a:pPr>
-            <a:r>
-              <a:t>Weaknesses</a:t>
-            </a:r>
-          </a:p>
-        </p:txBody>
-      </p:sp>
-      <p:sp>
-        <p:nvSpPr>
-          <p:cNvPr id="9" name="TextBox 8"/>
-          <p:cNvSpPr txBox="1"/>
-          <p:nvPr/>
-        </p:nvSpPr>
-        <p:spPr>
-          <a:xfrm>
-            <a:off x="4114800" y="1645920"/>
-            <a:ext cx="3474720" cy="3657600"/>
-          </a:xfrm>
-          <a:prstGeom prst="rect">
-            <a:avLst/>
-          </a:prstGeom>
-          <a:noFill/>
-        </p:spPr>
-        <p:txBody>
-          <a:bodyPr wrap="square">
-            <a:spAutoFit/>
-          </a:bodyPr>
-          <a:lstStyle/>
+              <a:t>• Brand Strength: score 90 (market avg 72</a:t>
+            </a:r>
+          </a:p>
           <a:p>
             <a:pPr>
               <a:spcAft>
@@ -20365,68 +20306,9 @@
               </a:defRPr>
             </a:pPr>
             <a:r>
-              <a:t>• 5G coverage gap at only 65.0%</a:t>
-            </a:r>
-          </a:p>
-        </p:txBody>
-      </p:sp>
-      <p:sp>
-        <p:nvSpPr>
-          <p:cNvPr id="10" name="TextBox 9"/>
-          <p:cNvSpPr txBox="1"/>
-          <p:nvPr/>
-        </p:nvSpPr>
-        <p:spPr>
-          <a:xfrm>
-            <a:off x="7772400" y="1280160"/>
-            <a:ext cx="3474720" cy="274320"/>
-          </a:xfrm>
-          <a:prstGeom prst="rect">
-            <a:avLst/>
-          </a:prstGeom>
-          <a:noFill/>
-        </p:spPr>
-        <p:txBody>
-          <a:bodyPr wrap="square">
-            <a:spAutoFit/>
-          </a:bodyPr>
-          <a:lstStyle/>
-          <a:p>
-            <a:pPr algn="l">
-              <a:defRPr sz="1300" b="1">
-                <a:solidFill>
-                  <a:srgbClr val="FFA500"/>
-                </a:solidFill>
-                <a:latin typeface="Arial"/>
-              </a:defRPr>
-            </a:pPr>
-            <a:r>
-              <a:t>Exposure Points</a:t>
-            </a:r>
-          </a:p>
-        </p:txBody>
-      </p:sp>
-      <p:sp>
-        <p:nvSpPr>
-          <p:cNvPr id="11" name="TextBox 10"/>
-          <p:cNvSpPr txBox="1"/>
-          <p:nvPr/>
-        </p:nvSpPr>
-        <p:spPr>
-          <a:xfrm>
-            <a:off x="7772400" y="1645920"/>
-            <a:ext cx="3474720" cy="3657600"/>
-          </a:xfrm>
-          <a:prstGeom prst="rect">
-            <a:avLst/>
-          </a:prstGeom>
-          <a:noFill/>
-        </p:spPr>
-        <p:txBody>
-          <a:bodyPr wrap="square">
-            <a:spAutoFit/>
-          </a:bodyPr>
-          <a:lstStyle/>
+              <a:t>• Customer Service: score 80 (market avg 65</a:t>
+            </a:r>
+          </a:p>
           <a:p>
             <a:pPr>
               <a:spcAft>
@@ -20440,9 +20322,208 @@
               </a:defRPr>
             </a:pPr>
             <a:r>
-              <a:t>• Intensifying market competition: Pressure on margins and market share</a:t>
-            </a:r>
-          </a:p>
+              <a:t>• Enterprise Solutions: score 80 (market avg 58</a:t>
+            </a:r>
+          </a:p>
+          <a:p>
+            <a:pPr>
+              <a:spcAft>
+                <a:spcPts val="400"/>
+              </a:spcAft>
+              <a:defRPr sz="1100">
+                <a:solidFill>
+                  <a:srgbClr val="333333"/>
+                </a:solidFill>
+                <a:latin typeface="Arial"/>
+              </a:defRPr>
+            </a:pPr>
+            <a:r>
+              <a:t>• Network Coverage: score 90 (market avg 72</a:t>
+            </a:r>
+          </a:p>
+          <a:p>
+            <a:pPr>
+              <a:spcAft>
+                <a:spcPts val="400"/>
+              </a:spcAft>
+              <a:defRPr sz="1100">
+                <a:solidFill>
+                  <a:srgbClr val="333333"/>
+                </a:solidFill>
+                <a:latin typeface="Arial"/>
+              </a:defRPr>
+            </a:pPr>
+            <a:r>
+              <a:t>• Network Quality: score 90 (market avg 68</a:t>
+            </a:r>
+          </a:p>
+        </p:txBody>
+      </p:sp>
+      <p:sp>
+        <p:nvSpPr>
+          <p:cNvPr id="8" name="TextBox 7"/>
+          <p:cNvSpPr txBox="1"/>
+          <p:nvPr/>
+        </p:nvSpPr>
+        <p:spPr>
+          <a:xfrm>
+            <a:off x="4114800" y="1280160"/>
+            <a:ext cx="3474720" cy="274320"/>
+          </a:xfrm>
+          <a:prstGeom prst="rect">
+            <a:avLst/>
+          </a:prstGeom>
+          <a:noFill/>
+        </p:spPr>
+        <p:txBody>
+          <a:bodyPr wrap="square">
+            <a:spAutoFit/>
+          </a:bodyPr>
+          <a:lstStyle/>
+          <a:p>
+            <a:pPr algn="l">
+              <a:defRPr sz="1300" b="1">
+                <a:solidFill>
+                  <a:srgbClr val="C80000"/>
+                </a:solidFill>
+                <a:latin typeface="Arial"/>
+              </a:defRPr>
+            </a:pPr>
+            <a:r>
+              <a:t>Weaknesses</a:t>
+            </a:r>
+          </a:p>
+        </p:txBody>
+      </p:sp>
+      <p:sp>
+        <p:nvSpPr>
+          <p:cNvPr id="9" name="TextBox 8"/>
+          <p:cNvSpPr txBox="1"/>
+          <p:nvPr/>
+        </p:nvSpPr>
+        <p:spPr>
+          <a:xfrm>
+            <a:off x="4114800" y="1645920"/>
+            <a:ext cx="3474720" cy="3657600"/>
+          </a:xfrm>
+          <a:prstGeom prst="rect">
+            <a:avLst/>
+          </a:prstGeom>
+          <a:noFill/>
+        </p:spPr>
+        <p:txBody>
+          <a:bodyPr wrap="square">
+            <a:spAutoFit/>
+          </a:bodyPr>
+          <a:lstStyle/>
+          <a:p>
+            <a:pPr>
+              <a:spcAft>
+                <a:spcPts val="400"/>
+              </a:spcAft>
+              <a:defRPr sz="1100">
+                <a:solidFill>
+                  <a:srgbClr val="333333"/>
+                </a:solidFill>
+                <a:latin typeface="Arial"/>
+              </a:defRPr>
+            </a:pPr>
+            <a:r>
+              <a:t>• Pricing Competitiveness: score 60 (market avg 70</a:t>
+            </a:r>
+          </a:p>
+          <a:p>
+            <a:pPr>
+              <a:spcAft>
+                <a:spcPts val="400"/>
+              </a:spcAft>
+              <a:defRPr sz="1100">
+                <a:solidFill>
+                  <a:srgbClr val="333333"/>
+                </a:solidFill>
+                <a:latin typeface="Arial"/>
+              </a:defRPr>
+            </a:pPr>
+            <a:r>
+              <a:t>• pricing_competitiveness: score 60 (market avg 70</a:t>
+            </a:r>
+          </a:p>
+          <a:p>
+            <a:pPr>
+              <a:spcAft>
+                <a:spcPts val="400"/>
+              </a:spcAft>
+              <a:defRPr sz="1100">
+                <a:solidFill>
+                  <a:srgbClr val="333333"/>
+                </a:solidFill>
+                <a:latin typeface="Arial"/>
+              </a:defRPr>
+            </a:pPr>
+            <a:r>
+              <a:t>• 5G coverage gap at only 65.0%</a:t>
+            </a:r>
+          </a:p>
+        </p:txBody>
+      </p:sp>
+      <p:sp>
+        <p:nvSpPr>
+          <p:cNvPr id="10" name="TextBox 9"/>
+          <p:cNvSpPr txBox="1"/>
+          <p:nvPr/>
+        </p:nvSpPr>
+        <p:spPr>
+          <a:xfrm>
+            <a:off x="7772400" y="1280160"/>
+            <a:ext cx="3474720" cy="274320"/>
+          </a:xfrm>
+          <a:prstGeom prst="rect">
+            <a:avLst/>
+          </a:prstGeom>
+          <a:noFill/>
+        </p:spPr>
+        <p:txBody>
+          <a:bodyPr wrap="square">
+            <a:spAutoFit/>
+          </a:bodyPr>
+          <a:lstStyle/>
+          <a:p>
+            <a:pPr algn="l">
+              <a:defRPr sz="1300" b="1">
+                <a:solidFill>
+                  <a:srgbClr val="FFA500"/>
+                </a:solidFill>
+                <a:latin typeface="Arial"/>
+              </a:defRPr>
+            </a:pPr>
+            <a:r>
+              <a:t>Exposure Points</a:t>
+            </a:r>
+          </a:p>
+        </p:txBody>
+      </p:sp>
+      <p:sp>
+        <p:nvSpPr>
+          <p:cNvPr id="11" name="TextBox 10"/>
+          <p:cNvSpPr txBox="1"/>
+          <p:nvPr/>
+        </p:nvSpPr>
+        <p:spPr>
+          <a:xfrm>
+            <a:off x="7772400" y="1645920"/>
+            <a:ext cx="3474720" cy="3657600"/>
+          </a:xfrm>
+          <a:prstGeom prst="rect">
+            <a:avLst/>
+          </a:prstGeom>
+          <a:noFill/>
+        </p:spPr>
+        <p:txBody>
+          <a:bodyPr wrap="square">
+            <a:spAutoFit/>
+          </a:bodyPr>
+          <a:lstStyle/>
+          <a:p/>
         </p:txBody>
       </p:sp>
       <p:sp>
@@ -20519,7 +20600,7 @@
               </a:defRPr>
             </a:pPr>
             <a:r>
-              <a:t>Key Message: Ranked #1 of 5 operators in market; revenue EUR 811000.0M; EBITDA margin 30.0%; overall healthy operations; key strength: Revenue on growth trajectory; key challenge: 5G coverage gap at only 65.0%; Management outlook: FY2025 total revenue CLP 2.1T (+4.2% YoY). EBITDA margin improved to 32.8% (+0.7pp). Management reaffirms FY2026 guidanc</a:t>
+              <a:t>Key Message: Ranked #1 of 5 operators in market; revenue EUR 811000.0M; EBITDA margin 30.0%; overall healthy operations; key strength: 5G Deployment; key challenge: Pricing Competitiveness; Management outlook: FY2025 total revenue CLP 2.1T (+4.2% YoY). EBITDA margin improved to 32.8% (+0.7pp). Management reaffirms FY2026 guidanc</a:t>
             </a:r>
           </a:p>
         </p:txBody>
@@ -20917,7 +20998,7 @@
               </a:defRPr>
             </a:pPr>
             <a:r>
-              <a:t>Leverage 'Revenue on growth trajectory' to capture the op...</a:t>
+              <a:t>Leverage '5G Deployment: score 80 (market avg 65)' to cap...</a:t>
             </a:r>
           </a:p>
         </p:txBody>
@@ -20989,7 +21070,7 @@
               </a:defRPr>
             </a:pPr>
             <a:r>
-              <a:t>Address weakness '5G coverage gap at only 65.0%' to unloc...</a:t>
+              <a:t>Address weakness 'Pricing Competitiveness: score 60 (mark...</a:t>
             </a:r>
           </a:p>
         </p:txBody>
@@ -21061,7 +21142,7 @@
               </a:defRPr>
             </a:pPr>
             <a:r>
-              <a:t>Use strength 'Revenue on growth trajectory' to counter th...</a:t>
+              <a:t>Use strength '5G Deployment: score 80 (market avg 65)' to...</a:t>
             </a:r>
           </a:p>
         </p:txBody>
@@ -21133,7 +21214,7 @@
               </a:defRPr>
             </a:pPr>
             <a:r>
-              <a:t>Mitigate weakness '5G coverage gap at only 65.0%' and def...</a:t>
+              <a:t>Mitigate weakness 'Pricing Competitiveness: score 60 (mar...</a:t>
             </a:r>
           </a:p>
         </p:txBody>
@@ -21212,7 +21293,7 @@
               </a:defRPr>
             </a:pPr>
             <a:r>
-              <a:t>Key Message: SWOT analysis identifies 2 strengths, 2 weaknesses, 9 opportunities, and 10 threats. The recommended strategic posture is cautious (WT-dominant).</a:t>
+              <a:t>Key Message: SWOT analysis identifies 18 strengths, 3 weaknesses, 9 opportunities, and 10 threats. The recommended strategic posture is offensive (SO-dominant).</a:t>
             </a:r>
           </a:p>
         </p:txBody>
@@ -21575,7 +21656,7 @@
               </a:defRPr>
             </a:pPr>
             <a:r>
-              <a:t>German telecom market totals EUR 1391000.0M in quarterly revenue; entel_cl holds 58.3% market share; gaps in Price, Availability; Market presents a balanced mix of opportunities and challenges.</a:t>
+              <a:t>Chile telecom market totals CLP 1391000.0M in quarterly revenue; entel_cl holds 58.3% market share; competitive strengths in Availability, Performance; Market presents a balanced mix of opportunities and challenges.</a:t>
             </a:r>
           </a:p>
         </p:txBody>
@@ -21805,7 +21886,7 @@
               </a:defRPr>
             </a:pPr>
             <a:r>
-              <a:t>Ranked #1 of 5 operators in market; revenue EUR 811000.0M; EBITDA margin 30.0%; overall healthy operations; key strength: Revenue on growth trajectory; key challenge: 5G coverage gap at only 65.0%; Management outlook: FY2025 total revenue CLP 2.1T (+4.2% YoY). EBITDA margin improved to 32.8% (+0.7pp). Management reaffirms FY2026 guidanc</a:t>
+              <a:t>Ranked #1 of 5 operators in market; revenue EUR 811000.0M; EBITDA margin 30.0%; overall healthy operations; key strength: 5G Deployment; key challenge: Pricing Competitiveness; Management outlook: FY2025 total revenue CLP 2.1T (+4.2% YoY). EBITDA margin improved to 32.8% (+0.7pp). Management reaffirms FY2026 guidanc</a:t>
             </a:r>
           </a:p>
         </p:txBody>
@@ -21920,7 +22001,7 @@
               </a:defRPr>
             </a:pPr>
             <a:r>
-              <a:t>SWOT analysis identifies 2 strengths, 2 weaknesses, 9 opportunities, and 10 threats. The recommended strategic posture is cautious (WT-dominant).</a:t>
+              <a:t>SWOT analysis identifies 18 strengths, 3 weaknesses, 9 opportunities, and 10 threats. The recommended strategic posture is offensive (SO-dominant).</a:t>
             </a:r>
           </a:p>
         </p:txBody>
@@ -22035,7 +22116,7 @@
               </a:defRPr>
             </a:pPr>
             <a:r>
-              <a:t>SPAN matrix positions 21 opportunities: 19 grow/invest, 2 acquire skills, 0 harvest, 0 avoid/exit. Focus resources on the 19 grow/invest items for maximum strategic impact.</a:t>
+              <a:t>SPAN matrix positions 24 opportunities: 21 grow/invest, 3 acquire skills, 0 harvest, 0 avoid/exit. Focus resources on the 21 grow/invest items for maximum strategic impact.</a:t>
             </a:r>
           </a:p>
         </p:txBody>
@@ -22519,7 +22600,7 @@
               </a:defRPr>
             </a:pPr>
             <a:r>
-              <a:t>Key Message: SPAN matrix positions 21 opportunities: 19 grow/invest, 2 acquire skills, 0 harvest, 0 avoid/exit. Focus resources on the 19 grow/invest items for maximum strategic impact.</a:t>
+              <a:t>Key Message: SPAN matrix positions 24 opportunities: 21 grow/invest, 3 acquire skills, 0 harvest, 0 avoid/exit. Focus resources on the 21 grow/invest items for maximum strategic impact.</a:t>
             </a:r>
           </a:p>
         </p:txBody>
@@ -22791,7 +22872,7 @@
               </a:defRPr>
             </a:pPr>
             <a:r>
-              <a:t>Key Message: SPAN matrix positions 21 opportunities: 19 grow/invest, 2 acquire skills, 0 harvest, 0 avoid/exit. Focus resources on the 19 grow/invest items for maximum strategic impact.</a:t>
+              <a:t>Key Message: SPAN matrix positions 24 opportunities: 21 grow/invest, 3 acquire skills, 0 harvest, 0 avoid/exit. Focus resources on the 21 grow/invest items for maximum strategic impact.</a:t>
             </a:r>
           </a:p>
         </p:txBody>
@@ -23190,7 +23271,7 @@
               </a:defRPr>
             </a:pPr>
             <a:r>
-              <a:t>Leverage 'Revenue on growth trajectory' to capture the opportunity of 'Regulatory Environment: Compliance requirements and spectrum policies directly affect entel_cl'.</a:t>
+              <a:t>Leverage '5G Deployment: score 80 (market avg 65)' to capture the opportunity of 'Regulatory Environment: Compliance requirements and spectrum policies directly affect entel_cl'.</a:t>
             </a:r>
           </a:p>
         </p:txBody>
@@ -23420,7 +23501,7 @@
               </a:defRPr>
             </a:pPr>
             <a:r>
-              <a:t>Leverage 'Top 1 in revenue market ranking' to capture the opportunity of 'National Digital Strategy: Fiber/5G coverage mandates may require entel_cl investment but also enable subsidy access'.</a:t>
+              <a:t>Leverage 'Brand Strength: score 90 (market avg 72)' to capture the opportunity of 'National Digital Strategy: Fiber/5G coverage mandates may require entel_cl investment but also enable subsidy access'.</a:t>
             </a:r>
           </a:p>
         </p:txBody>
@@ -23578,7 +23659,7 @@
               </a:defRPr>
             </a:pPr>
             <a:r>
-              <a:t>Entel Chile revenue growth 15.9% YoY</a:t>
+              <a:t>SO-3</a:t>
             </a:r>
           </a:p>
         </p:txBody>
@@ -23650,7 +23731,7 @@
               </a:defRPr>
             </a:pPr>
             <a:r>
-              <a:t>Entel Chile revenue growth 15.9% YoY</a:t>
+              <a:t>Leverage 'Customer Service: score 80 (market avg 65)' to capture the opportunity of 'SUBTEL mandates infrastructure sharing for 5G deployment in rural areas: Potential impact on entel_cl'.</a:t>
             </a:r>
           </a:p>
         </p:txBody>
@@ -23808,7 +23889,7 @@
               </a:defRPr>
             </a:pPr>
             <a:r>
-              <a:t>Entel FY2025: total revenue +4.2% to CLP 2.1T, mobile ARPU s</a:t>
+              <a:t>SO-4</a:t>
             </a:r>
           </a:p>
         </p:txBody>
@@ -23880,7 +23961,7 @@
               </a:defRPr>
             </a:pPr>
             <a:r>
-              <a:t>Entel FY2025: total revenue +4.2% to CLP 2.1T, mobile ARPU stable</a:t>
+              <a:t>Leverage 'Enterprise Solutions: score 80 (market avg 58)' to capture the opportunity of 'Entel Chile revenue growth 15.9% YoY'.</a:t>
             </a:r>
           </a:p>
         </p:txBody>
@@ -23959,7 +24040,7 @@
               </a:defRPr>
             </a:pPr>
             <a:r>
-              <a:t>Key Message: SPAN matrix positions 21 opportunities: 19 grow/invest, 2 acquire skills, 0 harvest, 0 avoid/exit. Focus resources on the 19 grow/invest items for maximum strategic impact.</a:t>
+              <a:t>Key Message: SPAN matrix positions 24 opportunities: 21 grow/invest, 3 acquire skills, 0 harvest, 0 avoid/exit. Focus resources on the 21 grow/invest items for maximum strategic impact.</a:t>
             </a:r>
           </a:p>
         </p:txBody>
@@ -24358,7 +24439,7 @@
               </a:defRPr>
             </a:pPr>
             <a:r>
-              <a:t>German telecom market totals EUR 1391000.0M in quarterly revenue; entel_cl holds 58.3% market share; gaps in Price, Availability; Market presents a balanced mix of opportunities and challenges.</a:t>
+              <a:t>Chile telecom market totals CLP 1391000.0M in quarterly revenue; entel_cl holds 58.3% market share; competitive strengths in Availability, Performance; Market presents a balanced mix of opportunities and challenges.</a:t>
             </a:r>
           </a:p>
         </p:txBody>
@@ -24588,7 +24669,7 @@
               </a:defRPr>
             </a:pPr>
             <a:r>
-              <a:t>Ranked #1 of 5 operators in market; revenue EUR 811000.0M; EBITDA margin 30.0%; overall healthy operations; key strength: Revenue on growth trajectory; key challenge: 5G coverage gap at only 65.0%; Management outlook: FY2025 total revenue CLP 2.1T (+4.2% YoY). EBITDA margin improved to 32.8% (+0.7pp). Management reaffirms FY2026 guidanc</a:t>
+              <a:t>Ranked #1 of 5 operators in market; revenue EUR 811000.0M; EBITDA margin 30.0%; overall healthy operations; key strength: 5G Deployment; key challenge: Pricing Competitiveness; Management outlook: FY2025 total revenue CLP 2.1T (+4.2% YoY). EBITDA margin improved to 32.8% (+0.7pp). Management reaffirms FY2026 guidanc</a:t>
             </a:r>
           </a:p>
         </p:txBody>
@@ -24703,7 +24784,7 @@
               </a:defRPr>
             </a:pPr>
             <a:r>
-              <a:t>SWOT analysis identifies 2 strengths, 2 weaknesses, 9 opportunities, and 10 threats. The recommended strategic posture is cautious (WT-dominant).</a:t>
+              <a:t>SWOT analysis identifies 18 strengths, 3 weaknesses, 9 opportunities, and 10 threats. The recommended strategic posture is offensive (SO-dominant).</a:t>
             </a:r>
           </a:p>
         </p:txBody>
@@ -24818,7 +24899,7 @@
               </a:defRPr>
             </a:pPr>
             <a:r>
-              <a:t>SPAN matrix positions 21 opportunities: 19 grow/invest, 2 acquire skills, 0 harvest, 0 avoid/exit. Focus resources on the 19 grow/invest items for maximum strategic impact.</a:t>
+              <a:t>SPAN matrix positions 24 opportunities: 21 grow/invest, 3 acquire skills, 0 harvest, 0 avoid/exit. Focus resources on the 21 grow/invest items for maximum strategic impact.</a:t>
             </a:r>
           </a:p>
         </p:txBody>
@@ -26003,7 +26084,7 @@
               </a:defRPr>
             </a:pPr>
             <a:r>
-              <a:t>EUR 1391.0B (quarterly, CQ4_2025</a:t>
+              <a:t>CLP 1391.0B (quarterly, CQ4_2025</a:t>
             </a:r>
           </a:p>
         </p:txBody>

</xml_diff>

<commit_message>
docs: regenerate Chile reports with bug fixes + add Markdown report
Re-ran Chile analysis after engine fixes (currency CLP, dedup dimensions).
Added Chinese Markdown formatted Five Looks report for Chile/Entel.

Co-Authored-By: Claude Opus 4.6 <noreply@anthropic.com>
</commit_message>
<xml_diff>
--- a/reports/chile/entel_cl/CQ4_2025/blm_entel_cl_analysis_cq4_2025.pptx
+++ b/reports/chile/entel_cl/CQ4_2025/blm_entel_cl_analysis_cq4_2025.pptx
@@ -3703,7 +3703,7 @@
               </a:defRPr>
             </a:pPr>
             <a:r>
-              <a:t>2026-02-11</a:t>
+              <a:t>2026-02-12</a:t>
             </a:r>
           </a:p>
         </p:txBody>
@@ -14492,7 +14492,7 @@
               </a:defRPr>
             </a:pPr>
             <a:r>
-              <a:t>Key Message: Ranked #1 of 5 operators in market; revenue EUR 811000.0M; EBITDA margin 30.0%; overall healthy operations; key strength: 5G Deployment; key challenge: Pricing Competitiveness; Management outlook: FY2025 total revenue CLP 2.1T (+4.2% YoY). EBITDA margin improved to 32.8% (+0.7pp). Management reaffirms FY2026 guidanc</a:t>
+              <a:t>Key Message: Ranked #1 of 5 operators in market; revenue CLP 811000.0M; EBITDA margin 30.0%; overall healthy operations; key strength: 5G Deployment; key challenge: Pricing Competitiveness; Management outlook: FY2025 total revenue CLP 2.1T (+4.2% YoY). EBITDA margin improved to 32.8% (+0.7pp). Management reaffirms FY2026 guidanc</a:t>
             </a:r>
           </a:p>
         </p:txBody>
@@ -16415,7 +16415,7 @@
               </a:defRPr>
             </a:pPr>
             <a:r>
-              <a:t>Key Message: Mobile service revenue at EUR 538000.0M; up 6.2% YoY; ARPU EUR 9500.0</a:t>
+              <a:t>Key Message: Mobile service revenue at 538000.0M; up 6.2% YoY; ARPU 9500.0</a:t>
             </a:r>
           </a:p>
         </p:txBody>
@@ -17254,7 +17254,7 @@
               </a:defRPr>
             </a:pPr>
             <a:r>
-              <a:t>Key Message: Fixed service revenue EUR 128000.0M; growth +3.2% YoY; Fiber subs 440K</a:t>
+              <a:t>Key Message: Fixed service revenue 128000.0M; growth +3.2% YoY; Fiber subs 440K</a:t>
             </a:r>
           </a:p>
         </p:txBody>
@@ -18077,7 +18077,7 @@
               </a:defRPr>
             </a:pPr>
             <a:r>
-              <a:t>Key Message: B2B revenue EUR 66000.0M; growth +5.0% YoY; 8.1% of total revenue</a:t>
+              <a:t>Key Message: B2B revenue 66000.0M; growth +5.0% YoY; 8.1% of total revenue</a:t>
             </a:r>
           </a:p>
         </p:txBody>
@@ -20445,22 +20445,6 @@
               </a:defRPr>
             </a:pPr>
             <a:r>
-              <a:t>• pricing_competitiveness: score 60 (market avg 70</a:t>
-            </a:r>
-          </a:p>
-          <a:p>
-            <a:pPr>
-              <a:spcAft>
-                <a:spcPts val="400"/>
-              </a:spcAft>
-              <a:defRPr sz="1100">
-                <a:solidFill>
-                  <a:srgbClr val="333333"/>
-                </a:solidFill>
-                <a:latin typeface="Arial"/>
-              </a:defRPr>
-            </a:pPr>
-            <a:r>
               <a:t>• 5G coverage gap at only 65.0%</a:t>
             </a:r>
           </a:p>
@@ -20600,7 +20584,7 @@
               </a:defRPr>
             </a:pPr>
             <a:r>
-              <a:t>Key Message: Ranked #1 of 5 operators in market; revenue EUR 811000.0M; EBITDA margin 30.0%; overall healthy operations; key strength: 5G Deployment; key challenge: Pricing Competitiveness; Management outlook: FY2025 total revenue CLP 2.1T (+4.2% YoY). EBITDA margin improved to 32.8% (+0.7pp). Management reaffirms FY2026 guidanc</a:t>
+              <a:t>Key Message: Ranked #1 of 5 operators in market; revenue CLP 811000.0M; EBITDA margin 30.0%; overall healthy operations; key strength: 5G Deployment; key challenge: Pricing Competitiveness; Management outlook: FY2025 total revenue CLP 2.1T (+4.2% YoY). EBITDA margin improved to 32.8% (+0.7pp). Management reaffirms FY2026 guidanc</a:t>
             </a:r>
           </a:p>
         </p:txBody>
@@ -21293,7 +21277,7 @@
               </a:defRPr>
             </a:pPr>
             <a:r>
-              <a:t>Key Message: SWOT analysis identifies 18 strengths, 3 weaknesses, 9 opportunities, and 10 threats. The recommended strategic posture is offensive (SO-dominant).</a:t>
+              <a:t>Key Message: SWOT analysis identifies 16 strengths, 2 weaknesses, 9 opportunities, and 10 threats. The recommended strategic posture is offensive (SO-dominant).</a:t>
             </a:r>
           </a:p>
         </p:txBody>
@@ -21886,7 +21870,7 @@
               </a:defRPr>
             </a:pPr>
             <a:r>
-              <a:t>Ranked #1 of 5 operators in market; revenue EUR 811000.0M; EBITDA margin 30.0%; overall healthy operations; key strength: 5G Deployment; key challenge: Pricing Competitiveness; Management outlook: FY2025 total revenue CLP 2.1T (+4.2% YoY). EBITDA margin improved to 32.8% (+0.7pp). Management reaffirms FY2026 guidanc</a:t>
+              <a:t>Ranked #1 of 5 operators in market; revenue CLP 811000.0M; EBITDA margin 30.0%; overall healthy operations; key strength: 5G Deployment; key challenge: Pricing Competitiveness; Management outlook: FY2025 total revenue CLP 2.1T (+4.2% YoY). EBITDA margin improved to 32.8% (+0.7pp). Management reaffirms FY2026 guidanc</a:t>
             </a:r>
           </a:p>
         </p:txBody>
@@ -22001,7 +21985,7 @@
               </a:defRPr>
             </a:pPr>
             <a:r>
-              <a:t>SWOT analysis identifies 18 strengths, 3 weaknesses, 9 opportunities, and 10 threats. The recommended strategic posture is offensive (SO-dominant).</a:t>
+              <a:t>SWOT analysis identifies 16 strengths, 2 weaknesses, 9 opportunities, and 10 threats. The recommended strategic posture is offensive (SO-dominant).</a:t>
             </a:r>
           </a:p>
         </p:txBody>
@@ -22116,7 +22100,7 @@
               </a:defRPr>
             </a:pPr>
             <a:r>
-              <a:t>SPAN matrix positions 24 opportunities: 21 grow/invest, 3 acquire skills, 0 harvest, 0 avoid/exit. Focus resources on the 21 grow/invest items for maximum strategic impact.</a:t>
+              <a:t>SPAN matrix positions 23 opportunities: 21 grow/invest, 2 acquire skills, 0 harvest, 0 avoid/exit. Focus resources on the 21 grow/invest items for maximum strategic impact.</a:t>
             </a:r>
           </a:p>
         </p:txBody>
@@ -22600,7 +22584,7 @@
               </a:defRPr>
             </a:pPr>
             <a:r>
-              <a:t>Key Message: SPAN matrix positions 24 opportunities: 21 grow/invest, 3 acquire skills, 0 harvest, 0 avoid/exit. Focus resources on the 21 grow/invest items for maximum strategic impact.</a:t>
+              <a:t>Key Message: SPAN matrix positions 23 opportunities: 21 grow/invest, 2 acquire skills, 0 harvest, 0 avoid/exit. Focus resources on the 21 grow/invest items for maximum strategic impact.</a:t>
             </a:r>
           </a:p>
         </p:txBody>
@@ -22872,7 +22856,7 @@
               </a:defRPr>
             </a:pPr>
             <a:r>
-              <a:t>Key Message: SPAN matrix positions 24 opportunities: 21 grow/invest, 3 acquire skills, 0 harvest, 0 avoid/exit. Focus resources on the 21 grow/invest items for maximum strategic impact.</a:t>
+              <a:t>Key Message: SPAN matrix positions 23 opportunities: 21 grow/invest, 2 acquire skills, 0 harvest, 0 avoid/exit. Focus resources on the 21 grow/invest items for maximum strategic impact.</a:t>
             </a:r>
           </a:p>
         </p:txBody>
@@ -24040,7 +24024,7 @@
               </a:defRPr>
             </a:pPr>
             <a:r>
-              <a:t>Key Message: SPAN matrix positions 24 opportunities: 21 grow/invest, 3 acquire skills, 0 harvest, 0 avoid/exit. Focus resources on the 21 grow/invest items for maximum strategic impact.</a:t>
+              <a:t>Key Message: SPAN matrix positions 23 opportunities: 21 grow/invest, 2 acquire skills, 0 harvest, 0 avoid/exit. Focus resources on the 21 grow/invest items for maximum strategic impact.</a:t>
             </a:r>
           </a:p>
         </p:txBody>
@@ -24669,7 +24653,7 @@
               </a:defRPr>
             </a:pPr>
             <a:r>
-              <a:t>Ranked #1 of 5 operators in market; revenue EUR 811000.0M; EBITDA margin 30.0%; overall healthy operations; key strength: 5G Deployment; key challenge: Pricing Competitiveness; Management outlook: FY2025 total revenue CLP 2.1T (+4.2% YoY). EBITDA margin improved to 32.8% (+0.7pp). Management reaffirms FY2026 guidanc</a:t>
+              <a:t>Ranked #1 of 5 operators in market; revenue CLP 811000.0M; EBITDA margin 30.0%; overall healthy operations; key strength: 5G Deployment; key challenge: Pricing Competitiveness; Management outlook: FY2025 total revenue CLP 2.1T (+4.2% YoY). EBITDA margin improved to 32.8% (+0.7pp). Management reaffirms FY2026 guidanc</a:t>
             </a:r>
           </a:p>
         </p:txBody>
@@ -24784,7 +24768,7 @@
               </a:defRPr>
             </a:pPr>
             <a:r>
-              <a:t>SWOT analysis identifies 18 strengths, 3 weaknesses, 9 opportunities, and 10 threats. The recommended strategic posture is offensive (SO-dominant).</a:t>
+              <a:t>SWOT analysis identifies 16 strengths, 2 weaknesses, 9 opportunities, and 10 threats. The recommended strategic posture is offensive (SO-dominant).</a:t>
             </a:r>
           </a:p>
         </p:txBody>
@@ -24899,7 +24883,7 @@
               </a:defRPr>
             </a:pPr>
             <a:r>
-              <a:t>SPAN matrix positions 24 opportunities: 21 grow/invest, 3 acquire skills, 0 harvest, 0 avoid/exit. Focus resources on the 21 grow/invest items for maximum strategic impact.</a:t>
+              <a:t>SPAN matrix positions 23 opportunities: 21 grow/invest, 2 acquire skills, 0 harvest, 0 avoid/exit. Focus resources on the 21 grow/invest items for maximum strategic impact.</a:t>
             </a:r>
           </a:p>
         </p:txBody>

</xml_diff>

<commit_message>
fix: competition scale auto-detection + QA report with 24 findings
- look_at_competition.py: auto-detect 0-10 vs 0-100 scoring scale,
  normalize dimension names (snake_case → Title Case), dedup by max
- seed_chile_v2.py: +24 intelligence events, +11 competitor earnings
  highlights (Movistar, Claro, WOM) — Chile now matches Germany depth
- docs/TODO-engine-improvements.md: 18 improvement items (TP-4A→4U)
  from full QA comparison of Germany vs Chile reports
- Regenerated all reports with fixes applied

Co-Authored-By: Claude Opus 4.6 <noreply@anthropic.com>
</commit_message>
<xml_diff>
--- a/reports/chile/entel_cl/CQ4_2025/blm_entel_cl_analysis_cq4_2025.pptx
+++ b/reports/chile/entel_cl/CQ4_2025/blm_entel_cl_analysis_cq4_2025.pptx
@@ -6054,7 +6054,7 @@
               </a:defRPr>
             </a:pPr>
             <a:r>
-              <a:t>• Chilean peso strengthens 8% against USD, easing equipment costs</a:t>
+              <a:t>• Chile telecom sector capex reaches $1.8B in 2025, highest ever</a:t>
             </a:r>
           </a:p>
           <a:p>
@@ -6070,7 +6070,7 @@
               </a:defRPr>
             </a:pPr>
             <a:r>
-              <a:t>• SUBTEL mandates infrastructure sharing for 5G deployment in rural areas</a:t>
+              <a:t>• Chile GDP growth 2.8% in 2025, consumer spending up 3.5%</a:t>
             </a:r>
           </a:p>
         </p:txBody>
@@ -6193,7 +6193,7 @@
               </a:defRPr>
             </a:pPr>
             <a:r>
-              <a:t>• Tigo Chile pivots to MVNO model, exits direct network investment</a:t>
+              <a:t>• WOM Chile post-restructuring: aggressive pricing returns to market</a:t>
             </a:r>
           </a:p>
         </p:txBody>
@@ -10769,70 +10769,7 @@
             <a:spAutoFit/>
           </a:bodyPr>
           <a:lstStyle/>
-          <a:p>
-            <a:pPr>
-              <a:spcAft>
-                <a:spcPts val="400"/>
-              </a:spcAft>
-              <a:defRPr sz="1100">
-                <a:solidFill>
-                  <a:srgbClr val="333333"/>
-                </a:solidFill>
-                <a:latin typeface="Arial"/>
-              </a:defRPr>
-            </a:pPr>
-            <a:r>
-              <a:t>• 5G Deployment: 5.0/100</a:t>
-            </a:r>
-          </a:p>
-          <a:p>
-            <a:pPr>
-              <a:spcAft>
-                <a:spcPts val="400"/>
-              </a:spcAft>
-              <a:defRPr sz="1100">
-                <a:solidFill>
-                  <a:srgbClr val="333333"/>
-                </a:solidFill>
-                <a:latin typeface="Arial"/>
-              </a:defRPr>
-            </a:pPr>
-            <a:r>
-              <a:t>• Brand Strength: 6.0/100</a:t>
-            </a:r>
-          </a:p>
-          <a:p>
-            <a:pPr>
-              <a:spcAft>
-                <a:spcPts val="400"/>
-              </a:spcAft>
-              <a:defRPr sz="1100">
-                <a:solidFill>
-                  <a:srgbClr val="333333"/>
-                </a:solidFill>
-                <a:latin typeface="Arial"/>
-              </a:defRPr>
-            </a:pPr>
-            <a:r>
-              <a:t>• Customer Service: 5.0/100</a:t>
-            </a:r>
-          </a:p>
-          <a:p>
-            <a:pPr>
-              <a:spcAft>
-                <a:spcPts val="400"/>
-              </a:spcAft>
-              <a:defRPr sz="1100">
-                <a:solidFill>
-                  <a:srgbClr val="333333"/>
-                </a:solidFill>
-                <a:latin typeface="Arial"/>
-              </a:defRPr>
-            </a:pPr>
-            <a:r>
-              <a:t>• Digital Services: 6.0/100</a:t>
-            </a:r>
-          </a:p>
+          <a:p/>
         </p:txBody>
       </p:sp>
       <p:sp>
@@ -12500,66 +12437,6 @@
             <a:spAutoFit/>
           </a:bodyPr>
           <a:lstStyle/>
-          <a:p/>
-        </p:txBody>
-      </p:sp>
-      <p:sp>
-        <p:nvSpPr>
-          <p:cNvPr id="21" name="TextBox 20"/>
-          <p:cNvSpPr txBox="1"/>
-          <p:nvPr/>
-        </p:nvSpPr>
-        <p:spPr>
-          <a:xfrm>
-            <a:off x="5943600" y="2560320"/>
-            <a:ext cx="5029200" cy="274320"/>
-          </a:xfrm>
-          <a:prstGeom prst="rect">
-            <a:avLst/>
-          </a:prstGeom>
-          <a:noFill/>
-        </p:spPr>
-        <p:txBody>
-          <a:bodyPr wrap="square">
-            <a:spAutoFit/>
-          </a:bodyPr>
-          <a:lstStyle/>
-          <a:p>
-            <a:pPr algn="l">
-              <a:defRPr sz="1300" b="1">
-                <a:solidFill>
-                  <a:srgbClr val="C80000"/>
-                </a:solidFill>
-                <a:latin typeface="Arial"/>
-              </a:defRPr>
-            </a:pPr>
-            <a:r>
-              <a:t>Weaknesses</a:t>
-            </a:r>
-          </a:p>
-        </p:txBody>
-      </p:sp>
-      <p:sp>
-        <p:nvSpPr>
-          <p:cNvPr id="22" name="TextBox 21"/>
-          <p:cNvSpPr txBox="1"/>
-          <p:nvPr/>
-        </p:nvSpPr>
-        <p:spPr>
-          <a:xfrm>
-            <a:off x="5943600" y="2834640"/>
-            <a:ext cx="5029200" cy="2286000"/>
-          </a:xfrm>
-          <a:prstGeom prst="rect">
-            <a:avLst/>
-          </a:prstGeom>
-          <a:noFill/>
-        </p:spPr>
-        <p:txBody>
-          <a:bodyPr wrap="square">
-            <a:spAutoFit/>
-          </a:bodyPr>
-          <a:lstStyle/>
           <a:p>
             <a:pPr>
               <a:spcAft>
@@ -12573,7 +12450,7 @@
               </a:defRPr>
             </a:pPr>
             <a:r>
-              <a:t>• 5G Deployment: 7.0/100</a:t>
+              <a:t>• Digital Capabilities: 80.0/100</a:t>
             </a:r>
           </a:p>
           <a:p>
@@ -12589,7 +12466,7 @@
               </a:defRPr>
             </a:pPr>
             <a:r>
-              <a:t>• Brand Strength: 7.0/100</a:t>
+              <a:t>• Digital Services: 80.0/100</a:t>
             </a:r>
           </a:p>
           <a:p>
@@ -12605,7 +12482,7 @@
               </a:defRPr>
             </a:pPr>
             <a:r>
-              <a:t>• Customer Service: 7.0/100</a:t>
+              <a:t>• Innovation: 80.0/100</a:t>
             </a:r>
           </a:p>
           <a:p>
@@ -12621,7 +12498,82 @@
               </a:defRPr>
             </a:pPr>
             <a:r>
-              <a:t>• Digital Services: 8.0/100</a:t>
+              <a:t>• Pricing Competitiveness: 90.0/100</a:t>
+            </a:r>
+          </a:p>
+        </p:txBody>
+      </p:sp>
+      <p:sp>
+        <p:nvSpPr>
+          <p:cNvPr id="21" name="TextBox 20"/>
+          <p:cNvSpPr txBox="1"/>
+          <p:nvPr/>
+        </p:nvSpPr>
+        <p:spPr>
+          <a:xfrm>
+            <a:off x="5943600" y="2560320"/>
+            <a:ext cx="5029200" cy="274320"/>
+          </a:xfrm>
+          <a:prstGeom prst="rect">
+            <a:avLst/>
+          </a:prstGeom>
+          <a:noFill/>
+        </p:spPr>
+        <p:txBody>
+          <a:bodyPr wrap="square">
+            <a:spAutoFit/>
+          </a:bodyPr>
+          <a:lstStyle/>
+          <a:p>
+            <a:pPr algn="l">
+              <a:defRPr sz="1300" b="1">
+                <a:solidFill>
+                  <a:srgbClr val="C80000"/>
+                </a:solidFill>
+                <a:latin typeface="Arial"/>
+              </a:defRPr>
+            </a:pPr>
+            <a:r>
+              <a:t>Weaknesses</a:t>
+            </a:r>
+          </a:p>
+        </p:txBody>
+      </p:sp>
+      <p:sp>
+        <p:nvSpPr>
+          <p:cNvPr id="22" name="TextBox 21"/>
+          <p:cNvSpPr txBox="1"/>
+          <p:nvPr/>
+        </p:nvSpPr>
+        <p:spPr>
+          <a:xfrm>
+            <a:off x="5943600" y="2834640"/>
+            <a:ext cx="5029200" cy="2286000"/>
+          </a:xfrm>
+          <a:prstGeom prst="rect">
+            <a:avLst/>
+          </a:prstGeom>
+          <a:noFill/>
+        </p:spPr>
+        <p:txBody>
+          <a:bodyPr wrap="square">
+            <a:spAutoFit/>
+          </a:bodyPr>
+          <a:lstStyle/>
+          <a:p>
+            <a:pPr>
+              <a:spcAft>
+                <a:spcPts val="400"/>
+              </a:spcAft>
+              <a:defRPr sz="1100">
+                <a:solidFill>
+                  <a:srgbClr val="333333"/>
+                </a:solidFill>
+                <a:latin typeface="Arial"/>
+              </a:defRPr>
+            </a:pPr>
+            <a:r>
+              <a:t>• Enterprise Solutions: 30.0/100</a:t>
             </a:r>
           </a:p>
         </p:txBody>
@@ -21277,7 +21229,7 @@
               </a:defRPr>
             </a:pPr>
             <a:r>
-              <a:t>Key Message: SWOT analysis identifies 16 strengths, 2 weaknesses, 9 opportunities, and 10 threats. The recommended strategic posture is offensive (SO-dominant).</a:t>
+              <a:t>Key Message: SWOT analysis identifies 16 strengths, 2 weaknesses, 21 opportunities, and 16 threats. The recommended strategic posture is offensive (SO-dominant).</a:t>
             </a:r>
           </a:p>
         </p:txBody>
@@ -21985,7 +21937,7 @@
               </a:defRPr>
             </a:pPr>
             <a:r>
-              <a:t>SWOT analysis identifies 16 strengths, 2 weaknesses, 9 opportunities, and 10 threats. The recommended strategic posture is offensive (SO-dominant).</a:t>
+              <a:t>SWOT analysis identifies 16 strengths, 2 weaknesses, 21 opportunities, and 16 threats. The recommended strategic posture is offensive (SO-dominant).</a:t>
             </a:r>
           </a:p>
         </p:txBody>
@@ -22100,7 +22052,7 @@
               </a:defRPr>
             </a:pPr>
             <a:r>
-              <a:t>SPAN matrix positions 23 opportunities: 21 grow/invest, 2 acquire skills, 0 harvest, 0 avoid/exit. Focus resources on the 21 grow/invest items for maximum strategic impact.</a:t>
+              <a:t>SPAN matrix positions 30 opportunities: 28 grow/invest, 2 acquire skills, 0 harvest, 0 avoid/exit. Focus resources on the 28 grow/invest items for maximum strategic impact.</a:t>
             </a:r>
           </a:p>
         </p:txBody>
@@ -22584,7 +22536,7 @@
               </a:defRPr>
             </a:pPr>
             <a:r>
-              <a:t>Key Message: SPAN matrix positions 23 opportunities: 21 grow/invest, 2 acquire skills, 0 harvest, 0 avoid/exit. Focus resources on the 21 grow/invest items for maximum strategic impact.</a:t>
+              <a:t>Key Message: SPAN matrix positions 30 opportunities: 28 grow/invest, 2 acquire skills, 0 harvest, 0 avoid/exit. Focus resources on the 28 grow/invest items for maximum strategic impact.</a:t>
             </a:r>
           </a:p>
         </p:txBody>
@@ -22856,7 +22808,7 @@
               </a:defRPr>
             </a:pPr>
             <a:r>
-              <a:t>Key Message: SPAN matrix positions 23 opportunities: 21 grow/invest, 2 acquire skills, 0 harvest, 0 avoid/exit. Focus resources on the 21 grow/invest items for maximum strategic impact.</a:t>
+              <a:t>Key Message: SPAN matrix positions 30 opportunities: 28 grow/invest, 2 acquire skills, 0 harvest, 0 avoid/exit. Focus resources on the 28 grow/invest items for maximum strategic impact.</a:t>
             </a:r>
           </a:p>
         </p:txBody>
@@ -23715,7 +23667,7 @@
               </a:defRPr>
             </a:pPr>
             <a:r>
-              <a:t>Leverage 'Customer Service: score 80 (market avg 65)' to capture the opportunity of 'SUBTEL mandates infrastructure sharing for 5G deployment in rural areas: Potential impact on entel_cl'.</a:t>
+              <a:t>Leverage 'Customer Service: score 80 (market avg 65)' to capture the opportunity of 'SUBTEL approves 700 MHz refarming for 5G rural broadband: Potential impact on entel_cl'.</a:t>
             </a:r>
           </a:p>
         </p:txBody>
@@ -23945,7 +23897,7 @@
               </a:defRPr>
             </a:pPr>
             <a:r>
-              <a:t>Leverage 'Enterprise Solutions: score 80 (market avg 58)' to capture the opportunity of 'Entel Chile revenue growth 15.9% YoY'.</a:t>
+              <a:t>Leverage 'Enterprise Solutions: score 80 (market avg 58)' to capture the opportunity of 'SUBTEL mandates infrastructure sharing for 5G deployment in rural areas: Potential impact on entel_cl'.</a:t>
             </a:r>
           </a:p>
         </p:txBody>
@@ -24024,7 +23976,7 @@
               </a:defRPr>
             </a:pPr>
             <a:r>
-              <a:t>Key Message: SPAN matrix positions 23 opportunities: 21 grow/invest, 2 acquire skills, 0 harvest, 0 avoid/exit. Focus resources on the 21 grow/invest items for maximum strategic impact.</a:t>
+              <a:t>Key Message: SPAN matrix positions 30 opportunities: 28 grow/invest, 2 acquire skills, 0 harvest, 0 avoid/exit. Focus resources on the 28 grow/invest items for maximum strategic impact.</a:t>
             </a:r>
           </a:p>
         </p:txBody>
@@ -24768,7 +24720,7 @@
               </a:defRPr>
             </a:pPr>
             <a:r>
-              <a:t>SWOT analysis identifies 16 strengths, 2 weaknesses, 9 opportunities, and 10 threats. The recommended strategic posture is offensive (SO-dominant).</a:t>
+              <a:t>SWOT analysis identifies 16 strengths, 2 weaknesses, 21 opportunities, and 16 threats. The recommended strategic posture is offensive (SO-dominant).</a:t>
             </a:r>
           </a:p>
         </p:txBody>
@@ -24883,7 +24835,7 @@
               </a:defRPr>
             </a:pPr>
             <a:r>
-              <a:t>SPAN matrix positions 23 opportunities: 21 grow/invest, 2 acquire skills, 0 harvest, 0 avoid/exit. Focus resources on the 21 grow/invest items for maximum strategic impact.</a:t>
+              <a:t>SPAN matrix positions 30 opportunities: 28 grow/invest, 2 acquire skills, 0 harvest, 0 avoid/exit. Focus resources on the 28 grow/invest items for maximum strategic impact.</a:t>
             </a:r>
           </a:p>
         </p:txBody>

</xml_diff>

<commit_message>
fix: Sprint 1 quick wins — 8 engine quality improvements
TP-4A: Fix customer segment cross-contamination — dynamic competitor
       names replace hardcoded Germany operators (O2/1&1/DT)
TP-4E: Fix key_message truncation — 120→250 chars with sentence boundary
TP-4I: Seed Tigo Chile competitive_scores (10 dimensions)
TP-4O: Fix SPAN opportunity name truncation — 60→120 chars
TP-4S: Fix Trends key_message double period (". " join → " " join)
TP-4T: Use display_name in market_shares (entel_cl → Entel Chile)
TP-4U: Include marginal operators in comparison_table (Tigo now shown)
TP-4C: Investigated — Claro data exists, threshold is Sprint 2 item

All 609 tests pass. Both Chile and Germany reports regenerated.

Co-Authored-By: Claude Opus 4.6 <noreply@anthropic.com>
</commit_message>
<xml_diff>
--- a/reports/chile/entel_cl/CQ4_2025/blm_entel_cl_analysis_cq4_2025.pptx
+++ b/reports/chile/entel_cl/CQ4_2025/blm_entel_cl_analysis_cq4_2025.pptx
@@ -4594,7 +4594,7 @@
               </a:defRPr>
             </a:pPr>
             <a:r>
-              <a:t>Key Message: Chile telecom market totals CLP 1391000.0M in quarterly revenue; entel_cl holds 58.3% market share; competitive strengths in Availability, Performance; Market presents a balanced mix of opportunities and challenges.</a:t>
+              <a:t>Key Message: Chile telecom market totals CLP 1391000.0M in quarterly revenue; competitive strengths in Availability, Performance; Market presents a balanced mix of opportunities and challenges.</a:t>
             </a:r>
           </a:p>
         </p:txBody>
@@ -4878,7 +4878,7 @@
               </a:defRPr>
             </a:pPr>
             <a:r>
-              <a:t>Trend: stable</a:t>
+              <a:t>Size: ~2.8M subscribers | Trend: growing | Our Share: ~39% of postpaid</a:t>
             </a:r>
           </a:p>
         </p:txBody>
@@ -5470,7 +5470,7 @@
               </a:defRPr>
             </a:pPr>
             <a:r>
-              <a:t>Key Message: Chile telecom market totals CLP 1391000.0M in quarterly revenue; entel_cl holds 58.3% market share; competitive strengths in Availability, Performance; Market presents a balanced mix of opportunities and challenges.</a:t>
+              <a:t>Key Message: Chile telecom market totals CLP 1391000.0M in quarterly revenue; competitive strengths in Availability, Performance; Market presents a balanced mix of opportunities and challenges.</a:t>
             </a:r>
           </a:p>
         </p:txBody>
@@ -5742,7 +5742,7 @@
               </a:defRPr>
             </a:pPr>
             <a:r>
-              <a:t>Key Message: Chile telecom market totals CLP 1391000.0M in quarterly revenue; entel_cl holds 58.3% market share; competitive strengths in Availability, Performance; Market presents a balanced mix of opportunities and challenges.</a:t>
+              <a:t>Key Message: Chile telecom market totals CLP 1391000.0M in quarterly revenue; competitive strengths in Availability, Performance; Market presents a balanced mix of opportunities and challenges.</a:t>
             </a:r>
           </a:p>
         </p:txBody>
@@ -6272,7 +6272,7 @@
               </a:defRPr>
             </a:pPr>
             <a:r>
-              <a:t>Key Message: Chile telecom market totals CLP 1391000.0M in quarterly revenue; entel_cl holds 58.3% market share; competitive strengths in Availability, Performance; Market presents a balanced mix of opportunities and challenges.</a:t>
+              <a:t>Key Message: Chile telecom market totals CLP 1391000.0M in quarterly revenue; competitive strengths in Availability, Performance; Market presents a balanced mix of opportunities and challenges.</a:t>
             </a:r>
           </a:p>
         </p:txBody>
@@ -11633,7 +11633,54 @@
             <a:spAutoFit/>
           </a:bodyPr>
           <a:lstStyle/>
-          <a:p/>
+          <a:p>
+            <a:pPr>
+              <a:spcAft>
+                <a:spcPts val="400"/>
+              </a:spcAft>
+              <a:defRPr sz="1100">
+                <a:solidFill>
+                  <a:srgbClr val="333333"/>
+                </a:solidFill>
+                <a:latin typeface="Arial"/>
+              </a:defRPr>
+            </a:pPr>
+            <a:r>
+              <a:t>• 5G Deployment: 20.0/100</a:t>
+            </a:r>
+          </a:p>
+          <a:p>
+            <a:pPr>
+              <a:spcAft>
+                <a:spcPts val="400"/>
+              </a:spcAft>
+              <a:defRPr sz="1100">
+                <a:solidFill>
+                  <a:srgbClr val="333333"/>
+                </a:solidFill>
+                <a:latin typeface="Arial"/>
+              </a:defRPr>
+            </a:pPr>
+            <a:r>
+              <a:t>• Network Coverage: 30.0/100</a:t>
+            </a:r>
+          </a:p>
+          <a:p>
+            <a:pPr>
+              <a:spcAft>
+                <a:spcPts val="400"/>
+              </a:spcAft>
+              <a:defRPr sz="1100">
+                <a:solidFill>
+                  <a:srgbClr val="333333"/>
+                </a:solidFill>
+                <a:latin typeface="Arial"/>
+              </a:defRPr>
+            </a:pPr>
+            <a:r>
+              <a:t>• Network Quality: 30.0/100</a:t>
+            </a:r>
+          </a:p>
         </p:txBody>
       </p:sp>
       <p:sp>
@@ -14444,7 +14491,7 @@
               </a:defRPr>
             </a:pPr>
             <a:r>
-              <a:t>Key Message: Ranked #1 of 5 operators in market; revenue CLP 811000.0M; EBITDA margin 30.0%; overall healthy operations; key strength: 5G Deployment; key challenge: Pricing Competitiveness; Management outlook: FY2025 total revenue CLP 2.1T (+4.2% YoY). EBITDA margin improved to 32.8% (+0.7pp). Management reaffirms FY2026 guidanc</a:t>
+              <a:t>Key Message: Ranked #1 of 5 operators in market; revenue CLP 811000.0M; EBITDA margin 30.0%; overall healthy operations; key strength: 5G Deployment; key challenge: Pricing Competitiveness; Management outlook: FY2025 total revenue CLP 2.1T (+4.2% YoY). EBITDA margin improved to 32.8% (+0.7pp). Management reaffirms FY2026 guidance: revenue growth 4-5%, EBITDA margin 33-34%. Capex/revenue expected at 16-18% as 5G build-out phase peaks.</a:t>
             </a:r>
           </a:p>
         </p:txBody>
@@ -20226,7 +20273,7 @@
               </a:defRPr>
             </a:pPr>
             <a:r>
-              <a:t>• 5G Deployment: score 80 (market avg 65</a:t>
+              <a:t>• 5G Deployment: score 80 (market avg 56</a:t>
             </a:r>
           </a:p>
           <a:p>
@@ -20242,7 +20289,7 @@
               </a:defRPr>
             </a:pPr>
             <a:r>
-              <a:t>• Brand Strength: score 90 (market avg 72</a:t>
+              <a:t>• Brand Strength: score 90 (market avg 69</a:t>
             </a:r>
           </a:p>
           <a:p>
@@ -20258,7 +20305,7 @@
               </a:defRPr>
             </a:pPr>
             <a:r>
-              <a:t>• Customer Service: score 80 (market avg 65</a:t>
+              <a:t>• Customer Service: score 80 (market avg 62</a:t>
             </a:r>
           </a:p>
           <a:p>
@@ -20274,7 +20321,7 @@
               </a:defRPr>
             </a:pPr>
             <a:r>
-              <a:t>• Enterprise Solutions: score 80 (market avg 58</a:t>
+              <a:t>• Digital Services: score 70 (market avg 66</a:t>
             </a:r>
           </a:p>
           <a:p>
@@ -20290,7 +20337,7 @@
               </a:defRPr>
             </a:pPr>
             <a:r>
-              <a:t>• Network Coverage: score 90 (market avg 72</a:t>
+              <a:t>• Enterprise Solutions: score 80 (market avg 56</a:t>
             </a:r>
           </a:p>
           <a:p>
@@ -20306,7 +20353,7 @@
               </a:defRPr>
             </a:pPr>
             <a:r>
-              <a:t>• Network Quality: score 90 (market avg 68</a:t>
+              <a:t>• Network Coverage: score 90 (market avg 64</a:t>
             </a:r>
           </a:p>
         </p:txBody>
@@ -20381,7 +20428,7 @@
               </a:defRPr>
             </a:pPr>
             <a:r>
-              <a:t>• Pricing Competitiveness: score 60 (market avg 70</a:t>
+              <a:t>• Pricing Competitiveness: score 60 (market avg 69</a:t>
             </a:r>
           </a:p>
           <a:p>
@@ -20536,7 +20583,7 @@
               </a:defRPr>
             </a:pPr>
             <a:r>
-              <a:t>Key Message: Ranked #1 of 5 operators in market; revenue CLP 811000.0M; EBITDA margin 30.0%; overall healthy operations; key strength: 5G Deployment; key challenge: Pricing Competitiveness; Management outlook: FY2025 total revenue CLP 2.1T (+4.2% YoY). EBITDA margin improved to 32.8% (+0.7pp). Management reaffirms FY2026 guidanc</a:t>
+              <a:t>Key Message: Ranked #1 of 5 operators in market; revenue CLP 811000.0M; EBITDA margin 30.0%; overall healthy operations; key strength: 5G Deployment; key challenge: Pricing Competitiveness; Management outlook: FY2025 total revenue CLP 2.1T (+4.2% YoY). EBITDA margin improved to 32.8% (+0.7pp). Management reaffirms FY2026 guidance: revenue growth 4-5%, EBITDA margin 33-34%. Capex/revenue expected at 16-18% as 5G build-out phase peaks.</a:t>
             </a:r>
           </a:p>
         </p:txBody>
@@ -20934,7 +20981,7 @@
               </a:defRPr>
             </a:pPr>
             <a:r>
-              <a:t>Leverage '5G Deployment: score 80 (market avg 65)' to cap...</a:t>
+              <a:t>Leverage '5G Deployment: score 80 (market avg 56)' to cap...</a:t>
             </a:r>
           </a:p>
         </p:txBody>
@@ -21078,7 +21125,7 @@
               </a:defRPr>
             </a:pPr>
             <a:r>
-              <a:t>Use strength '5G Deployment: score 80 (market avg 65)' to...</a:t>
+              <a:t>Use strength '5G Deployment: score 80 (market avg 56)' to...</a:t>
             </a:r>
           </a:p>
         </p:txBody>
@@ -21229,7 +21276,7 @@
               </a:defRPr>
             </a:pPr>
             <a:r>
-              <a:t>Key Message: SWOT analysis identifies 16 strengths, 2 weaknesses, 21 opportunities, and 16 threats. The recommended strategic posture is offensive (SO-dominant).</a:t>
+              <a:t>Key Message: SWOT analysis identifies 17 strengths, 2 weaknesses, 21 opportunities, and 16 threats. The recommended strategic posture is offensive (SO-dominant).</a:t>
             </a:r>
           </a:p>
         </p:txBody>
@@ -21477,7 +21524,7 @@
               </a:defRPr>
             </a:pPr>
             <a:r>
-              <a:t>Macro environment: Favorable. Key opportunities: Regulatory Environment, National Digital Strategy. Key risks: Regulatory Environment, Fiber Broadband Penetration.. Industry is in late growth phase. (+7.2% YoY (CQ2_2025 -&gt; CQ4_2025)</a:t>
+              <a:t>Macro environment: Favorable. Key opportunities: Regulatory Environment, National Digital Strategy. Key risks: Regulatory Environment, Fiber Broadband Penetration Industry is in late growth phase. (+7.2% YoY (CQ2_2025 -&gt; CQ4_2025)</a:t>
             </a:r>
           </a:p>
         </p:txBody>
@@ -21592,7 +21639,7 @@
               </a:defRPr>
             </a:pPr>
             <a:r>
-              <a:t>Chile telecom market totals CLP 1391000.0M in quarterly revenue; entel_cl holds 58.3% market share; competitive strengths in Availability, Performance; Market presents a balanced mix of opportunities and challenges.</a:t>
+              <a:t>Chile telecom market totals CLP 1391000.0M in quarterly revenue; competitive strengths in Availability, Performance; Market presents a balanced mix of opportunities and challenges.</a:t>
             </a:r>
           </a:p>
         </p:txBody>
@@ -21822,7 +21869,7 @@
               </a:defRPr>
             </a:pPr>
             <a:r>
-              <a:t>Ranked #1 of 5 operators in market; revenue CLP 811000.0M; EBITDA margin 30.0%; overall healthy operations; key strength: 5G Deployment; key challenge: Pricing Competitiveness; Management outlook: FY2025 total revenue CLP 2.1T (+4.2% YoY). EBITDA margin improved to 32.8% (+0.7pp). Management reaffirms FY2026 guidanc</a:t>
+              <a:t>Ranked #1 of 5 operators in market; revenue CLP 811000.0M; EBITDA margin 30.0%; overall healthy operations; key strength: 5G Deployment; key challenge: Pricing Competitiveness; Management outlook: FY2025 total revenue CLP 2.1T (+4.2% YoY). EBITDA margin improved to 32.8% (+0.7pp). Management reaffirms FY2026 guidance: revenue growth 4-5%, EBITDA margin 33-34%. Capex/revenue expected at 16-18% as 5G build-out phase peaks.</a:t>
             </a:r>
           </a:p>
         </p:txBody>
@@ -21937,7 +21984,7 @@
               </a:defRPr>
             </a:pPr>
             <a:r>
-              <a:t>SWOT analysis identifies 16 strengths, 2 weaknesses, 21 opportunities, and 16 threats. The recommended strategic posture is offensive (SO-dominant).</a:t>
+              <a:t>SWOT analysis identifies 17 strengths, 2 weaknesses, 21 opportunities, and 16 threats. The recommended strategic posture is offensive (SO-dominant).</a:t>
             </a:r>
           </a:p>
         </p:txBody>
@@ -22052,7 +22099,7 @@
               </a:defRPr>
             </a:pPr>
             <a:r>
-              <a:t>SPAN matrix positions 30 opportunities: 28 grow/invest, 2 acquire skills, 0 harvest, 0 avoid/exit. Focus resources on the 28 grow/invest items for maximum strategic impact.</a:t>
+              <a:t>SPAN matrix positions 33 opportunities: 31 grow/invest, 2 acquire skills, 0 harvest, 0 avoid/exit. Focus resources on the 31 grow/invest items for maximum strategic impact.</a:t>
             </a:r>
           </a:p>
         </p:txBody>
@@ -22536,7 +22583,7 @@
               </a:defRPr>
             </a:pPr>
             <a:r>
-              <a:t>Key Message: SPAN matrix positions 30 opportunities: 28 grow/invest, 2 acquire skills, 0 harvest, 0 avoid/exit. Focus resources on the 28 grow/invest items for maximum strategic impact.</a:t>
+              <a:t>Key Message: SPAN matrix positions 33 opportunities: 31 grow/invest, 2 acquire skills, 0 harvest, 0 avoid/exit. Focus resources on the 31 grow/invest items for maximum strategic impact.</a:t>
             </a:r>
           </a:p>
         </p:txBody>
@@ -22808,7 +22855,7 @@
               </a:defRPr>
             </a:pPr>
             <a:r>
-              <a:t>Key Message: SPAN matrix positions 30 opportunities: 28 grow/invest, 2 acquire skills, 0 harvest, 0 avoid/exit. Focus resources on the 28 grow/invest items for maximum strategic impact.</a:t>
+              <a:t>Key Message: SPAN matrix positions 33 opportunities: 31 grow/invest, 2 acquire skills, 0 harvest, 0 avoid/exit. Focus resources on the 31 grow/invest items for maximum strategic impact.</a:t>
             </a:r>
           </a:p>
         </p:txBody>
@@ -23207,7 +23254,7 @@
               </a:defRPr>
             </a:pPr>
             <a:r>
-              <a:t>Leverage '5G Deployment: score 80 (market avg 65)' to capture the opportunity of 'Regulatory Environment: Compliance requirements and spectrum policies directly affect entel_cl'.</a:t>
+              <a:t>Leverage '5G Deployment: score 80 (market avg 56)' to capture the opportunity of 'Regulatory Environment: Compliance requirements and spectrum policies directly affect entel_cl'.</a:t>
             </a:r>
           </a:p>
         </p:txBody>
@@ -23437,7 +23484,7 @@
               </a:defRPr>
             </a:pPr>
             <a:r>
-              <a:t>Leverage 'Brand Strength: score 90 (market avg 72)' to capture the opportunity of 'National Digital Strategy: Fiber/5G coverage mandates may require entel_cl investment but also enable subsidy access'.</a:t>
+              <a:t>Leverage 'Brand Strength: score 90 (market avg 69)' to capture the opportunity of 'National Digital Strategy: Fiber/5G coverage mandates may require entel_cl investment but also enable subsidy access'.</a:t>
             </a:r>
           </a:p>
         </p:txBody>
@@ -23667,7 +23714,7 @@
               </a:defRPr>
             </a:pPr>
             <a:r>
-              <a:t>Leverage 'Customer Service: score 80 (market avg 65)' to capture the opportunity of 'SUBTEL approves 700 MHz refarming for 5G rural broadband: Potential impact on entel_cl'.</a:t>
+              <a:t>Leverage 'Customer Service: score 80 (market avg 62)' to capture the opportunity of 'SUBTEL approves 700 MHz refarming for 5G rural broadband: Potential impact on entel_cl'.</a:t>
             </a:r>
           </a:p>
         </p:txBody>
@@ -23897,7 +23944,7 @@
               </a:defRPr>
             </a:pPr>
             <a:r>
-              <a:t>Leverage 'Enterprise Solutions: score 80 (market avg 58)' to capture the opportunity of 'SUBTEL mandates infrastructure sharing for 5G deployment in rural areas: Potential impact on entel_cl'.</a:t>
+              <a:t>Leverage 'Digital Services: score 70 (market avg 66)' to capture the opportunity of 'SUBTEL mandates infrastructure sharing for 5G deployment in rural areas: Potential impact on entel_cl'.</a:t>
             </a:r>
           </a:p>
         </p:txBody>
@@ -23976,7 +24023,7 @@
               </a:defRPr>
             </a:pPr>
             <a:r>
-              <a:t>Key Message: SPAN matrix positions 30 opportunities: 28 grow/invest, 2 acquire skills, 0 harvest, 0 avoid/exit. Focus resources on the 28 grow/invest items for maximum strategic impact.</a:t>
+              <a:t>Key Message: SPAN matrix positions 33 opportunities: 31 grow/invest, 2 acquire skills, 0 harvest, 0 avoid/exit. Focus resources on the 31 grow/invest items for maximum strategic impact.</a:t>
             </a:r>
           </a:p>
         </p:txBody>
@@ -24260,7 +24307,7 @@
               </a:defRPr>
             </a:pPr>
             <a:r>
-              <a:t>Macro environment: Favorable. Key opportunities: Regulatory Environment, National Digital Strategy. Key risks: Regulatory Environment, Fiber Broadband Penetration.. Industry is in late growth phase. (+7.2% YoY (CQ2_2025 -&gt; CQ4_2025)</a:t>
+              <a:t>Macro environment: Favorable. Key opportunities: Regulatory Environment, National Digital Strategy. Key risks: Regulatory Environment, Fiber Broadband Penetration Industry is in late growth phase. (+7.2% YoY (CQ2_2025 -&gt; CQ4_2025)</a:t>
             </a:r>
           </a:p>
         </p:txBody>
@@ -24375,7 +24422,7 @@
               </a:defRPr>
             </a:pPr>
             <a:r>
-              <a:t>Chile telecom market totals CLP 1391000.0M in quarterly revenue; entel_cl holds 58.3% market share; competitive strengths in Availability, Performance; Market presents a balanced mix of opportunities and challenges.</a:t>
+              <a:t>Chile telecom market totals CLP 1391000.0M in quarterly revenue; competitive strengths in Availability, Performance; Market presents a balanced mix of opportunities and challenges.</a:t>
             </a:r>
           </a:p>
         </p:txBody>
@@ -24605,7 +24652,7 @@
               </a:defRPr>
             </a:pPr>
             <a:r>
-              <a:t>Ranked #1 of 5 operators in market; revenue CLP 811000.0M; EBITDA margin 30.0%; overall healthy operations; key strength: 5G Deployment; key challenge: Pricing Competitiveness; Management outlook: FY2025 total revenue CLP 2.1T (+4.2% YoY). EBITDA margin improved to 32.8% (+0.7pp). Management reaffirms FY2026 guidanc</a:t>
+              <a:t>Ranked #1 of 5 operators in market; revenue CLP 811000.0M; EBITDA margin 30.0%; overall healthy operations; key strength: 5G Deployment; key challenge: Pricing Competitiveness; Management outlook: FY2025 total revenue CLP 2.1T (+4.2% YoY). EBITDA margin improved to 32.8% (+0.7pp). Management reaffirms FY2026 guidance: revenue growth 4-5%, EBITDA margin 33-34%. Capex/revenue expected at 16-18% as 5G build-out phase peaks.</a:t>
             </a:r>
           </a:p>
         </p:txBody>
@@ -24720,7 +24767,7 @@
               </a:defRPr>
             </a:pPr>
             <a:r>
-              <a:t>SWOT analysis identifies 16 strengths, 2 weaknesses, 21 opportunities, and 16 threats. The recommended strategic posture is offensive (SO-dominant).</a:t>
+              <a:t>SWOT analysis identifies 17 strengths, 2 weaknesses, 21 opportunities, and 16 threats. The recommended strategic posture is offensive (SO-dominant).</a:t>
             </a:r>
           </a:p>
         </p:txBody>
@@ -24835,7 +24882,7 @@
               </a:defRPr>
             </a:pPr>
             <a:r>
-              <a:t>SPAN matrix positions 30 opportunities: 28 grow/invest, 2 acquire skills, 0 harvest, 0 avoid/exit. Focus resources on the 28 grow/invest items for maximum strategic impact.</a:t>
+              <a:t>SPAN matrix positions 33 opportunities: 31 grow/invest, 2 acquire skills, 0 harvest, 0 avoid/exit. Focus resources on the 31 grow/invest items for maximum strategic impact.</a:t>
             </a:r>
           </a:p>
         </p:txBody>
@@ -26619,7 +26666,7 @@
               </a:defRPr>
             </a:pPr>
             <a:r>
-              <a:t>Key Message: Macro environment: Favorable. Key opportunities: Regulatory Environment, National Digital Strategy. Key risks: Regulatory Environment, Fiber Broadband Penetration.. Industry is in late growth phase. (+7.2% YoY (CQ2_2025 -&gt; CQ4_2025)</a:t>
+              <a:t>Key Message: Macro environment: Favorable. Key opportunities: Regulatory Environment, National Digital Strategy. Key risks: Regulatory Environment, Fiber Broadband Penetration Industry is in late growth phase. (+7.2% YoY (CQ2_2025 -&gt; CQ4_2025)</a:t>
             </a:r>
           </a:p>
         </p:txBody>
@@ -26938,7 +26985,7 @@
               </a:defRPr>
             </a:pPr>
             <a:r>
-              <a:t>Key Message: Macro environment: Favorable. Key opportunities: Regulatory Environment, National Digital Strategy. Key risks: Regulatory Environment, Fiber Broadband Penetration.. Industry is in late growth phase. (+7.2% YoY (CQ2_2025 -&gt; CQ4_2025)</a:t>
+              <a:t>Key Message: Macro environment: Favorable. Key opportunities: Regulatory Environment, National Digital Strategy. Key risks: Regulatory Environment, Fiber Broadband Penetration Industry is in late growth phase. (+7.2% YoY (CQ2_2025 -&gt; CQ4_2025)</a:t>
             </a:r>
           </a:p>
         </p:txBody>

</xml_diff>

<commit_message>
data: regenerate Germany and Chile reports with TP-6 fields populated
All 10 new fields now present in reports: vs_competitors, cost_impact,
consumer_impact, b2b_impact, controlled_vs_resale, evolution_strategy,
homepass_vs_connect (enhanced), attributions, action_required, org_culture.
Audit scores stable: Germany 96/A, Chile 93/A.

Co-Authored-By: Claude Opus 4.6 <noreply@anthropic.com>
</commit_message>
<xml_diff>
--- a/reports/chile/entel_cl/CQ4_2025/blm_entel_cl_analysis_cq4_2025.pptx
+++ b/reports/chile/entel_cl/CQ4_2025/blm_entel_cl_analysis_cq4_2025.pptx
@@ -4594,7 +4594,7 @@
               </a:defRPr>
             </a:pPr>
             <a:r>
-              <a:t>Key Message: Chile telecom market totals CLP 1391000.0M in quarterly revenue; competitive strengths in Availability, Performance; Market presents a balanced mix of opportunities and challenges.</a:t>
+              <a:t>Key Message: Chile telecom market totals CLP 1.39T in quarterly revenue; competitive strengths in Availability, Performance; Market presents a balanced mix of opportunities and challenges.</a:t>
             </a:r>
           </a:p>
         </p:txBody>
@@ -5470,7 +5470,7 @@
               </a:defRPr>
             </a:pPr>
             <a:r>
-              <a:t>Key Message: Chile telecom market totals CLP 1391000.0M in quarterly revenue; competitive strengths in Availability, Performance; Market presents a balanced mix of opportunities and challenges.</a:t>
+              <a:t>Key Message: Chile telecom market totals CLP 1.39T in quarterly revenue; competitive strengths in Availability, Performance; Market presents a balanced mix of opportunities and challenges.</a:t>
             </a:r>
           </a:p>
         </p:txBody>
@@ -5742,7 +5742,7 @@
               </a:defRPr>
             </a:pPr>
             <a:r>
-              <a:t>Key Message: Chile telecom market totals CLP 1391000.0M in quarterly revenue; competitive strengths in Availability, Performance; Market presents a balanced mix of opportunities and challenges.</a:t>
+              <a:t>Key Message: Chile telecom market totals CLP 1.39T in quarterly revenue; competitive strengths in Availability, Performance; Market presents a balanced mix of opportunities and challenges.</a:t>
             </a:r>
           </a:p>
         </p:txBody>
@@ -6272,7 +6272,7 @@
               </a:defRPr>
             </a:pPr>
             <a:r>
-              <a:t>Key Message: Chile telecom market totals CLP 1391000.0M in quarterly revenue; competitive strengths in Availability, Performance; Market presents a balanced mix of opportunities and challenges.</a:t>
+              <a:t>Key Message: Chile telecom market totals CLP 1.39T in quarterly revenue; competitive strengths in Availability, Performance; Market presents a balanced mix of opportunities and challenges.</a:t>
             </a:r>
           </a:p>
         </p:txBody>
@@ -10709,7 +10709,22 @@
             <a:spAutoFit/>
           </a:bodyPr>
           <a:lstStyle/>
-          <a:p/>
+          <a:p>
+            <a:pPr>
+              <a:spcAft>
+                <a:spcPts val="400"/>
+              </a:spcAft>
+              <a:defRPr sz="1100">
+                <a:solidFill>
+                  <a:srgbClr val="333333"/>
+                </a:solidFill>
+                <a:latin typeface="Arial"/>
+              </a:defRPr>
+            </a:pPr>
+            <a:r>
+              <a:t>• Network Coverage: score 70 (market avg 64</a:t>
+            </a:r>
+          </a:p>
         </p:txBody>
       </p:sp>
       <p:sp>
@@ -10769,12 +10784,111 @@
             <a:spAutoFit/>
           </a:bodyPr>
           <a:lstStyle/>
-          <a:p/>
-        </p:txBody>
-      </p:sp>
-      <p:sp>
-        <p:nvSpPr>
-          <p:cNvPr id="23" name="Rectangle 22"/>
+          <a:p>
+            <a:pPr>
+              <a:spcAft>
+                <a:spcPts val="400"/>
+              </a:spcAft>
+              <a:defRPr sz="1100">
+                <a:solidFill>
+                  <a:srgbClr val="333333"/>
+                </a:solidFill>
+                <a:latin typeface="Arial"/>
+              </a:defRPr>
+            </a:pPr>
+            <a:r>
+              <a:t>• 5G Deployment: score 50 (market avg 56</a:t>
+            </a:r>
+          </a:p>
+          <a:p>
+            <a:pPr>
+              <a:spcAft>
+                <a:spcPts val="400"/>
+              </a:spcAft>
+              <a:defRPr sz="1100">
+                <a:solidFill>
+                  <a:srgbClr val="333333"/>
+                </a:solidFill>
+                <a:latin typeface="Arial"/>
+              </a:defRPr>
+            </a:pPr>
+            <a:r>
+              <a:t>• Brand Strength: score 60 (market avg 66</a:t>
+            </a:r>
+          </a:p>
+          <a:p>
+            <a:pPr>
+              <a:spcAft>
+                <a:spcPts val="400"/>
+              </a:spcAft>
+              <a:defRPr sz="1100">
+                <a:solidFill>
+                  <a:srgbClr val="333333"/>
+                </a:solidFill>
+                <a:latin typeface="Arial"/>
+              </a:defRPr>
+            </a:pPr>
+            <a:r>
+              <a:t>• Customer Experience: score 50 (market avg 65</a:t>
+            </a:r>
+          </a:p>
+          <a:p>
+            <a:pPr>
+              <a:spcAft>
+                <a:spcPts val="400"/>
+              </a:spcAft>
+              <a:defRPr sz="1100">
+                <a:solidFill>
+                  <a:srgbClr val="333333"/>
+                </a:solidFill>
+                <a:latin typeface="Arial"/>
+              </a:defRPr>
+            </a:pPr>
+            <a:r>
+              <a:t>• Customer Service: score 50 (market avg 62</a:t>
+            </a:r>
+          </a:p>
+        </p:txBody>
+      </p:sp>
+      <p:sp>
+        <p:nvSpPr>
+          <p:cNvPr id="23" name="TextBox 22"/>
+          <p:cNvSpPr txBox="1"/>
+          <p:nvPr/>
+        </p:nvSpPr>
+        <p:spPr>
+          <a:xfrm>
+            <a:off x="457200" y="5029200"/>
+            <a:ext cx="10972800" cy="457200"/>
+          </a:xfrm>
+          <a:prstGeom prst="rect">
+            <a:avLst/>
+          </a:prstGeom>
+          <a:noFill/>
+        </p:spPr>
+        <p:txBody>
+          <a:bodyPr wrap="square">
+            <a:spAutoFit/>
+          </a:bodyPr>
+          <a:lstStyle/>
+          <a:p>
+            <a:pPr algn="l">
+              <a:defRPr sz="1100" b="0">
+                <a:solidFill>
+                  <a:srgbClr val="333333"/>
+                </a:solidFill>
+                <a:latin typeface="Arial"/>
+              </a:defRPr>
+            </a:pPr>
+            <a:r>
+              <a:t>Strategy: Revenue-led profitable growth; subscriber acquisition focus</a:t>
+            </a:r>
+          </a:p>
+        </p:txBody>
+      </p:sp>
+      <p:sp>
+        <p:nvSpPr>
+          <p:cNvPr id="24" name="Rectangle 23"/>
           <p:cNvSpPr/>
           <p:nvPr/>
         </p:nvSpPr>
@@ -10817,7 +10931,7 @@
       </p:sp>
       <p:sp>
         <p:nvSpPr>
-          <p:cNvPr id="24" name="TextBox 23"/>
+          <p:cNvPr id="25" name="TextBox 24"/>
           <p:cNvSpPr txBox="1"/>
           <p:nvPr/>
         </p:nvSpPr>
@@ -11646,7 +11760,7 @@
               </a:defRPr>
             </a:pPr>
             <a:r>
-              <a:t>• 5G Deployment: 20.0/100</a:t>
+              <a:t>• 5G Deployment: score 20 (market avg 56</a:t>
             </a:r>
           </a:p>
           <a:p>
@@ -11662,7 +11776,7 @@
               </a:defRPr>
             </a:pPr>
             <a:r>
-              <a:t>• Network Coverage: 30.0/100</a:t>
+              <a:t>• Brand Strength: score 40 (market avg 66</a:t>
             </a:r>
           </a:p>
           <a:p>
@@ -11678,14 +11792,66 @@
               </a:defRPr>
             </a:pPr>
             <a:r>
-              <a:t>• Network Quality: 30.0/100</a:t>
-            </a:r>
-          </a:p>
-        </p:txBody>
-      </p:sp>
-      <p:sp>
-        <p:nvSpPr>
-          <p:cNvPr id="23" name="Rectangle 22"/>
+              <a:t>• Customer Service: score 50 (market avg 62</a:t>
+            </a:r>
+          </a:p>
+          <a:p>
+            <a:pPr>
+              <a:spcAft>
+                <a:spcPts val="400"/>
+              </a:spcAft>
+              <a:defRPr sz="1100">
+                <a:solidFill>
+                  <a:srgbClr val="333333"/>
+                </a:solidFill>
+                <a:latin typeface="Arial"/>
+              </a:defRPr>
+            </a:pPr>
+            <a:r>
+              <a:t>• Digital Services: score 50 (market avg 66</a:t>
+            </a:r>
+          </a:p>
+        </p:txBody>
+      </p:sp>
+      <p:sp>
+        <p:nvSpPr>
+          <p:cNvPr id="23" name="TextBox 22"/>
+          <p:cNvSpPr txBox="1"/>
+          <p:nvPr/>
+        </p:nvSpPr>
+        <p:spPr>
+          <a:xfrm>
+            <a:off x="457200" y="5029200"/>
+            <a:ext cx="10972800" cy="457200"/>
+          </a:xfrm>
+          <a:prstGeom prst="rect">
+            <a:avLst/>
+          </a:prstGeom>
+          <a:noFill/>
+        </p:spPr>
+        <p:txBody>
+          <a:bodyPr wrap="square">
+            <a:spAutoFit/>
+          </a:bodyPr>
+          <a:lstStyle/>
+          <a:p>
+            <a:pPr algn="l">
+              <a:defRPr sz="1100" b="0">
+                <a:solidFill>
+                  <a:srgbClr val="333333"/>
+                </a:solidFill>
+                <a:latin typeface="Arial"/>
+              </a:defRPr>
+            </a:pPr>
+            <a:r>
+              <a:t>Strategy: Defensive cost restructuring; ARPU-led value strategy</a:t>
+            </a:r>
+          </a:p>
+        </p:txBody>
+      </p:sp>
+      <p:sp>
+        <p:nvSpPr>
+          <p:cNvPr id="24" name="Rectangle 23"/>
           <p:cNvSpPr/>
           <p:nvPr/>
         </p:nvSpPr>
@@ -11728,7 +11894,7 @@
       </p:sp>
       <p:sp>
         <p:nvSpPr>
-          <p:cNvPr id="24" name="TextBox 23"/>
+          <p:cNvPr id="25" name="TextBox 24"/>
           <p:cNvSpPr txBox="1"/>
           <p:nvPr/>
         </p:nvSpPr>
@@ -12497,7 +12663,7 @@
               </a:defRPr>
             </a:pPr>
             <a:r>
-              <a:t>• Digital Capabilities: 80.0/100</a:t>
+              <a:t>• 5G Deployment: score 70 (market avg 56</a:t>
             </a:r>
           </a:p>
           <a:p>
@@ -12513,7 +12679,7 @@
               </a:defRPr>
             </a:pPr>
             <a:r>
-              <a:t>• Digital Services: 80.0/100</a:t>
+              <a:t>• Customer Experience: score 70 (market avg 65</a:t>
             </a:r>
           </a:p>
           <a:p>
@@ -12529,7 +12695,7 @@
               </a:defRPr>
             </a:pPr>
             <a:r>
-              <a:t>• Innovation: 80.0/100</a:t>
+              <a:t>• Customer Service: score 70 (market avg 62</a:t>
             </a:r>
           </a:p>
           <a:p>
@@ -12545,7 +12711,7 @@
               </a:defRPr>
             </a:pPr>
             <a:r>
-              <a:t>• Pricing Competitiveness: 90.0/100</a:t>
+              <a:t>• Digital Capabilities: score 80 (market avg 70</a:t>
             </a:r>
           </a:p>
         </p:txBody>
@@ -12620,14 +12786,98 @@
               </a:defRPr>
             </a:pPr>
             <a:r>
-              <a:t>• Enterprise Solutions: 30.0/100</a:t>
-            </a:r>
-          </a:p>
-        </p:txBody>
-      </p:sp>
-      <p:sp>
-        <p:nvSpPr>
-          <p:cNvPr id="23" name="Rectangle 22"/>
+              <a:t>• Enterprise Solutions: score 30 (market avg 56</a:t>
+            </a:r>
+          </a:p>
+          <a:p>
+            <a:pPr>
+              <a:spcAft>
+                <a:spcPts val="400"/>
+              </a:spcAft>
+              <a:defRPr sz="1100">
+                <a:solidFill>
+                  <a:srgbClr val="333333"/>
+                </a:solidFill>
+                <a:latin typeface="Arial"/>
+              </a:defRPr>
+            </a:pPr>
+            <a:r>
+              <a:t>• Financial Strength: score 40 (market avg 65</a:t>
+            </a:r>
+          </a:p>
+          <a:p>
+            <a:pPr>
+              <a:spcAft>
+                <a:spcPts val="400"/>
+              </a:spcAft>
+              <a:defRPr sz="1100">
+                <a:solidFill>
+                  <a:srgbClr val="333333"/>
+                </a:solidFill>
+                <a:latin typeface="Arial"/>
+              </a:defRPr>
+            </a:pPr>
+            <a:r>
+              <a:t>• Market Share: score 60 (market avg 68</a:t>
+            </a:r>
+          </a:p>
+          <a:p>
+            <a:pPr>
+              <a:spcAft>
+                <a:spcPts val="400"/>
+              </a:spcAft>
+              <a:defRPr sz="1100">
+                <a:solidFill>
+                  <a:srgbClr val="333333"/>
+                </a:solidFill>
+                <a:latin typeface="Arial"/>
+              </a:defRPr>
+            </a:pPr>
+            <a:r>
+              <a:t>• Network Coverage: score 50 (market avg 64</a:t>
+            </a:r>
+          </a:p>
+        </p:txBody>
+      </p:sp>
+      <p:sp>
+        <p:nvSpPr>
+          <p:cNvPr id="23" name="TextBox 22"/>
+          <p:cNvSpPr txBox="1"/>
+          <p:nvPr/>
+        </p:nvSpPr>
+        <p:spPr>
+          <a:xfrm>
+            <a:off x="457200" y="5029200"/>
+            <a:ext cx="10972800" cy="457200"/>
+          </a:xfrm>
+          <a:prstGeom prst="rect">
+            <a:avLst/>
+          </a:prstGeom>
+          <a:noFill/>
+        </p:spPr>
+        <p:txBody>
+          <a:bodyPr wrap="square">
+            <a:spAutoFit/>
+          </a:bodyPr>
+          <a:lstStyle/>
+          <a:p>
+            <a:pPr algn="l">
+              <a:defRPr sz="1100" b="0">
+                <a:solidFill>
+                  <a:srgbClr val="333333"/>
+                </a:solidFill>
+                <a:latin typeface="Arial"/>
+              </a:defRPr>
+            </a:pPr>
+            <a:r>
+              <a:t>Strategy: Revenue-led profitable growth; subscriber acquisition focus</a:t>
+            </a:r>
+          </a:p>
+        </p:txBody>
+      </p:sp>
+      <p:sp>
+        <p:nvSpPr>
+          <p:cNvPr id="24" name="Rectangle 23"/>
           <p:cNvSpPr/>
           <p:nvPr/>
         </p:nvSpPr>
@@ -12670,7 +12920,7 @@
       </p:sp>
       <p:sp>
         <p:nvSpPr>
-          <p:cNvPr id="24" name="TextBox 23"/>
+          <p:cNvPr id="25" name="TextBox 24"/>
           <p:cNvSpPr txBox="1"/>
           <p:nvPr/>
         </p:nvSpPr>
@@ -14491,7 +14741,7 @@
               </a:defRPr>
             </a:pPr>
             <a:r>
-              <a:t>Key Message: Ranked #1 of 5 operators in market; revenue CLP 811000.0M; EBITDA margin 30.0%; overall healthy operations; key strength: 5G Deployment; key challenge: Pricing Competitiveness; Management outlook: FY2025 total revenue CLP 2.1T (+4.2% YoY). EBITDA margin improved to 32.8% (+0.7pp). Management reaffirms FY2026 guidance: revenue growth 4-5%, EBITDA margin 33-34%. Capex/revenue expected at 16-18% as 5G build-out phase peaks.</a:t>
+              <a:t>Key Message: Ranked #1 of 5 operators in market; revenue CLP 811.0B; EBITDA margin 30.0%; overall healthy operations; key strength: 5G Deployment; key challenge: Pricing Competitiveness; Management outlook: FY2025 total revenue CLP 2.1T (+4.2% YoY). EBITDA margin improved to 32.8% (+0.7pp). Management reaffirms FY2026 guidance: revenue growth 4-5%, EBITDA margin 33-34%. Capex/revenue expected at 16-18% as 5G build-out phase peaks.</a:t>
             </a:r>
           </a:p>
         </p:txBody>
@@ -15071,7 +15321,7 @@
               </a:defRPr>
             </a:pPr>
             <a:r>
-              <a:t>19</a:t>
+              <a:t>20</a:t>
             </a:r>
           </a:p>
         </p:txBody>
@@ -15337,7 +15587,7 @@
               </a:defRPr>
             </a:pPr>
             <a:r>
-              <a:t>0</a:t>
+              <a:t>19</a:t>
             </a:r>
           </a:p>
         </p:txBody>
@@ -15452,7 +15702,7 @@
               </a:defRPr>
             </a:pPr>
             <a:r>
-              <a:t>19</a:t>
+              <a:t>1</a:t>
             </a:r>
           </a:p>
         </p:txBody>
@@ -15488,7 +15738,7 @@
               </a:defRPr>
             </a:pPr>
             <a:r>
-              <a:t>Unique Sources: 0</a:t>
+              <a:t>Unique Sources: 36</a:t>
             </a:r>
             <a:br/>
             <a:r>
@@ -15575,7 +15825,7 @@
               </a:defRPr>
             </a:pPr>
             <a:r>
-              <a:t>Key Message: 19 data points tracked, 0 high-confidence (0%</a:t>
+              <a:t>Key Message: 20 data points tracked, 0 high-confidence (0%</a:t>
             </a:r>
           </a:p>
         </p:txBody>
@@ -16338,6 +16588,54 @@
               <a:t>• arpu: improving</a:t>
             </a:r>
           </a:p>
+          <a:p>
+            <a:pPr>
+              <a:spcAft>
+                <a:spcPts val="400"/>
+              </a:spcAft>
+              <a:defRPr sz="1100">
+                <a:solidFill>
+                  <a:srgbClr val="333333"/>
+                </a:solidFill>
+                <a:latin typeface="Arial"/>
+              </a:defRPr>
+            </a:pPr>
+            <a:r>
+              <a:t>• EBITDA margin expanded 70bps to 32.8%. Opex-to-revenue improved to 67.2%. Operational efficiency program delivered CLP 45B savings. Energy costs down 8% via renewable energy contracts. Capex/revenue a</a:t>
+            </a:r>
+          </a:p>
+          <a:p>
+            <a:pPr>
+              <a:spcAft>
+                <a:spcPts val="400"/>
+              </a:spcAft>
+              <a:defRPr sz="1100">
+                <a:solidFill>
+                  <a:srgbClr val="333333"/>
+                </a:solidFill>
+                <a:latin typeface="Arial"/>
+              </a:defRPr>
+            </a:pPr>
+            <a:r>
+              <a:t>• Enterprise revenue grew 8.5% YoY driven by cloud (+22%), cybersecurity (+35%), and private 5G contracts with BHP and Codelco. B2B now 28% of total revenue. Won 3 new private 5G network contracts worth</a:t>
+            </a:r>
+          </a:p>
+          <a:p>
+            <a:pPr>
+              <a:spcAft>
+                <a:spcPts val="400"/>
+              </a:spcAft>
+              <a:defRPr sz="1100">
+                <a:solidFill>
+                  <a:srgbClr val="333333"/>
+                </a:solidFill>
+                <a:latin typeface="Arial"/>
+              </a:defRPr>
+            </a:pPr>
+            <a:r>
+              <a:t>• Postpaid subscriber base grew 5.8% YoY to 5.1M. Blended mobile ARPU stable at CLP 8,200 despite WOM competition. Premium tier (&gt;CLP 25K) grew 12%, now 22% of postpaid base. 5G users reached 1.2M with</a:t>
+            </a:r>
+          </a:p>
         </p:txBody>
       </p:sp>
       <p:sp>
@@ -16414,7 +16712,7 @@
               </a:defRPr>
             </a:pPr>
             <a:r>
-              <a:t>Key Message: Mobile service revenue at 538000.0M; up 6.2% YoY; ARPU 9500.0</a:t>
+              <a:t>Key Message: Mobile service revenue at 538.0B; up 6.2% YoY; ARPU 9500.0</a:t>
             </a:r>
           </a:p>
         </p:txBody>
@@ -17177,6 +17475,54 @@
               <a:t>• arpu: improving</a:t>
             </a:r>
           </a:p>
+          <a:p>
+            <a:pPr>
+              <a:spcAft>
+                <a:spcPts val="400"/>
+              </a:spcAft>
+              <a:defRPr sz="1100">
+                <a:solidFill>
+                  <a:srgbClr val="333333"/>
+                </a:solidFill>
+                <a:latin typeface="Arial"/>
+              </a:defRPr>
+            </a:pPr>
+            <a:r>
+              <a:t>• FTTH subscriber base reached 820K (+28% YoY). Copper-to-fiber migration 65% complete, full sunset targeted end-2027. Fiber ARPU 15% higher than legacy copper. Homes passed reached 2.8M. FMC penetratio</a:t>
+            </a:r>
+          </a:p>
+          <a:p>
+            <a:pPr>
+              <a:spcAft>
+                <a:spcPts val="400"/>
+              </a:spcAft>
+              <a:defRPr sz="1100">
+                <a:solidFill>
+                  <a:srgbClr val="333333"/>
+                </a:solidFill>
+                <a:latin typeface="Arial"/>
+              </a:defRPr>
+            </a:pPr>
+            <a:r>
+              <a:t>• revenue increased 3.2% QoQ</a:t>
+            </a:r>
+          </a:p>
+          <a:p>
+            <a:pPr>
+              <a:spcAft>
+                <a:spcPts val="400"/>
+              </a:spcAft>
+              <a:defRPr sz="1100">
+                <a:solidFill>
+                  <a:srgbClr val="333333"/>
+                </a:solidFill>
+                <a:latin typeface="Arial"/>
+              </a:defRPr>
+            </a:pPr>
+            <a:r>
+              <a:t>• subscribers increased 3.7% QoQ</a:t>
+            </a:r>
+          </a:p>
         </p:txBody>
       </p:sp>
       <p:sp>
@@ -17253,7 +17599,7 @@
               </a:defRPr>
             </a:pPr>
             <a:r>
-              <a:t>Key Message: Fixed service revenue 128000.0M; growth +3.2% YoY; Fiber subs 440K</a:t>
+              <a:t>Key Message: Fixed service revenue 128.0B; growth +3.2% YoY; Fiber subs 440K</a:t>
             </a:r>
           </a:p>
         </p:txBody>
@@ -18000,6 +18346,54 @@
               <a:t>• customers: improving</a:t>
             </a:r>
           </a:p>
+          <a:p>
+            <a:pPr>
+              <a:spcAft>
+                <a:spcPts val="400"/>
+              </a:spcAft>
+              <a:defRPr sz="1100">
+                <a:solidFill>
+                  <a:srgbClr val="333333"/>
+                </a:solidFill>
+                <a:latin typeface="Arial"/>
+              </a:defRPr>
+            </a:pPr>
+            <a:r>
+              <a:t>• Enterprise revenue grew 8.5% YoY driven by cloud (+22%), cybersecurity (+35%), and private 5G contracts with BHP and Codelco. B2B now 28% of total revenue. Won 3 new private 5G network contracts worth</a:t>
+            </a:r>
+          </a:p>
+          <a:p>
+            <a:pPr>
+              <a:spcAft>
+                <a:spcPts val="400"/>
+              </a:spcAft>
+              <a:defRPr sz="1100">
+                <a:solidFill>
+                  <a:srgbClr val="333333"/>
+                </a:solidFill>
+                <a:latin typeface="Arial"/>
+              </a:defRPr>
+            </a:pPr>
+            <a:r>
+              <a:t>• 5G SA network launched covering 45% population. Network slicing tested with 3 mining enterprise customers. 5G FWA serves 50K rural households. SUBTEL infrastructure sharing regulation is net positive</a:t>
+            </a:r>
+          </a:p>
+          <a:p>
+            <a:pPr>
+              <a:spcAft>
+                <a:spcPts val="400"/>
+              </a:spcAft>
+              <a:defRPr sz="1100">
+                <a:solidFill>
+                  <a:srgbClr val="333333"/>
+                </a:solidFill>
+                <a:latin typeface="Arial"/>
+              </a:defRPr>
+            </a:pPr>
+            <a:r>
+              <a:t>• revenue increased 3.1% QoQ</a:t>
+            </a:r>
+          </a:p>
         </p:txBody>
       </p:sp>
       <p:sp>
@@ -18076,7 +18470,7 @@
               </a:defRPr>
             </a:pPr>
             <a:r>
-              <a:t>Key Message: B2B revenue 66000.0M; growth +5.0% YoY; 8.1% of total revenue</a:t>
+              <a:t>Key Message: B2B revenue 66.0B; growth +5.0% YoY; 8.1% of total revenue</a:t>
             </a:r>
           </a:p>
         </p:txBody>
@@ -18839,6 +19233,54 @@
               <a:t>• fmc_subscribers: improving</a:t>
             </a:r>
           </a:p>
+          <a:p>
+            <a:pPr>
+              <a:spcAft>
+                <a:spcPts val="400"/>
+              </a:spcAft>
+              <a:defRPr sz="1100">
+                <a:solidFill>
+                  <a:srgbClr val="333333"/>
+                </a:solidFill>
+                <a:latin typeface="Arial"/>
+              </a:defRPr>
+            </a:pPr>
+            <a:r>
+              <a:t>• revenue increased 7.7% QoQ</a:t>
+            </a:r>
+          </a:p>
+          <a:p>
+            <a:pPr>
+              <a:spcAft>
+                <a:spcPts val="400"/>
+              </a:spcAft>
+              <a:defRPr sz="1100">
+                <a:solidFill>
+                  <a:srgbClr val="333333"/>
+                </a:solidFill>
+                <a:latin typeface="Arial"/>
+              </a:defRPr>
+            </a:pPr>
+            <a:r>
+              <a:t>• subscribers increased 9.1% QoQ</a:t>
+            </a:r>
+          </a:p>
+          <a:p>
+            <a:pPr>
+              <a:spcAft>
+                <a:spcPts val="400"/>
+              </a:spcAft>
+              <a:defRPr sz="1100">
+                <a:solidFill>
+                  <a:srgbClr val="333333"/>
+                </a:solidFill>
+                <a:latin typeface="Arial"/>
+              </a:defRPr>
+            </a:pPr>
+            <a:r>
+              <a:t>• fmc_subscribers increased 4.8% QoQ</a:t>
+            </a:r>
+          </a:p>
         </p:txBody>
       </p:sp>
       <p:sp>
@@ -19963,6 +20405,554 @@
         </p:nvSpPr>
         <p:spPr>
           <a:xfrm>
+            <a:off x="3200400" y="1280160"/>
+            <a:ext cx="2560320" cy="1097280"/>
+          </a:xfrm>
+          <a:prstGeom prst="rect">
+            <a:avLst/>
+          </a:prstGeom>
+          <a:solidFill>
+            <a:srgbClr val="F5F5F5"/>
+          </a:solidFill>
+          <a:ln>
+            <a:noFill/>
+          </a:ln>
+        </p:spPr>
+        <p:style>
+          <a:lnRef idx="1">
+            <a:schemeClr val="accent1"/>
+          </a:lnRef>
+          <a:fillRef idx="3">
+            <a:schemeClr val="accent1"/>
+          </a:fillRef>
+          <a:effectRef idx="2">
+            <a:schemeClr val="accent1"/>
+          </a:effectRef>
+          <a:fontRef idx="minor">
+            <a:schemeClr val="lt1"/>
+          </a:fontRef>
+        </p:style>
+        <p:txBody>
+          <a:bodyPr rtlCol="0" anchor="ctr"/>
+          <a:lstStyle/>
+          <a:p>
+            <a:pPr algn="ctr"/>
+          </a:p>
+        </p:txBody>
+      </p:sp>
+      <p:sp>
+        <p:nvSpPr>
+          <p:cNvPr id="10" name="TextBox 9"/>
+          <p:cNvSpPr txBox="1"/>
+          <p:nvPr/>
+        </p:nvSpPr>
+        <p:spPr>
+          <a:xfrm>
+            <a:off x="3337560" y="1371600"/>
+            <a:ext cx="2286000" cy="320040"/>
+          </a:xfrm>
+          <a:prstGeom prst="rect">
+            <a:avLst/>
+          </a:prstGeom>
+          <a:noFill/>
+        </p:spPr>
+        <p:txBody>
+          <a:bodyPr wrap="square">
+            <a:spAutoFit/>
+          </a:bodyPr>
+          <a:lstStyle/>
+          <a:p>
+            <a:pPr algn="l">
+              <a:defRPr sz="1000" b="0">
+                <a:solidFill>
+                  <a:srgbClr val="808080"/>
+                </a:solidFill>
+                <a:latin typeface="Arial"/>
+              </a:defRPr>
+            </a:pPr>
+            <a:r>
+              <a:t>C Suite Count</a:t>
+            </a:r>
+          </a:p>
+        </p:txBody>
+      </p:sp>
+      <p:sp>
+        <p:nvSpPr>
+          <p:cNvPr id="11" name="TextBox 10"/>
+          <p:cNvSpPr txBox="1"/>
+          <p:nvPr/>
+        </p:nvSpPr>
+        <p:spPr>
+          <a:xfrm>
+            <a:off x="3337560" y="1691639"/>
+            <a:ext cx="2286000" cy="365760"/>
+          </a:xfrm>
+          <a:prstGeom prst="rect">
+            <a:avLst/>
+          </a:prstGeom>
+          <a:noFill/>
+        </p:spPr>
+        <p:txBody>
+          <a:bodyPr wrap="square">
+            <a:spAutoFit/>
+          </a:bodyPr>
+          <a:lstStyle/>
+          <a:p>
+            <a:pPr algn="l">
+              <a:defRPr sz="1800" b="1">
+                <a:solidFill>
+                  <a:srgbClr val="003366"/>
+                </a:solidFill>
+                <a:latin typeface="Arial"/>
+              </a:defRPr>
+            </a:pPr>
+            <a:r>
+              <a:t>3</a:t>
+            </a:r>
+          </a:p>
+        </p:txBody>
+      </p:sp>
+      <p:sp>
+        <p:nvSpPr>
+          <p:cNvPr id="12" name="Rectangle 11"/>
+          <p:cNvSpPr/>
+          <p:nvPr/>
+        </p:nvSpPr>
+        <p:spPr>
+          <a:xfrm>
+            <a:off x="5943600" y="1280160"/>
+            <a:ext cx="2560320" cy="1097280"/>
+          </a:xfrm>
+          <a:prstGeom prst="rect">
+            <a:avLst/>
+          </a:prstGeom>
+          <a:solidFill>
+            <a:srgbClr val="F5F5F5"/>
+          </a:solidFill>
+          <a:ln>
+            <a:noFill/>
+          </a:ln>
+        </p:spPr>
+        <p:style>
+          <a:lnRef idx="1">
+            <a:schemeClr val="accent1"/>
+          </a:lnRef>
+          <a:fillRef idx="3">
+            <a:schemeClr val="accent1"/>
+          </a:fillRef>
+          <a:effectRef idx="2">
+            <a:schemeClr val="accent1"/>
+          </a:effectRef>
+          <a:fontRef idx="minor">
+            <a:schemeClr val="lt1"/>
+          </a:fontRef>
+        </p:style>
+        <p:txBody>
+          <a:bodyPr rtlCol="0" anchor="ctr"/>
+          <a:lstStyle/>
+          <a:p>
+            <a:pPr algn="ctr"/>
+          </a:p>
+        </p:txBody>
+      </p:sp>
+      <p:sp>
+        <p:nvSpPr>
+          <p:cNvPr id="13" name="TextBox 12"/>
+          <p:cNvSpPr txBox="1"/>
+          <p:nvPr/>
+        </p:nvSpPr>
+        <p:spPr>
+          <a:xfrm>
+            <a:off x="6080760" y="1371600"/>
+            <a:ext cx="2286000" cy="320040"/>
+          </a:xfrm>
+          <a:prstGeom prst="rect">
+            <a:avLst/>
+          </a:prstGeom>
+          <a:noFill/>
+        </p:spPr>
+        <p:txBody>
+          <a:bodyPr wrap="square">
+            <a:spAutoFit/>
+          </a:bodyPr>
+          <a:lstStyle/>
+          <a:p>
+            <a:pPr algn="l">
+              <a:defRPr sz="1000" b="0">
+                <a:solidFill>
+                  <a:srgbClr val="808080"/>
+                </a:solidFill>
+                <a:latin typeface="Arial"/>
+              </a:defRPr>
+            </a:pPr>
+            <a:r>
+              <a:t>Avg Tenure Years</a:t>
+            </a:r>
+          </a:p>
+        </p:txBody>
+      </p:sp>
+      <p:sp>
+        <p:nvSpPr>
+          <p:cNvPr id="14" name="TextBox 13"/>
+          <p:cNvSpPr txBox="1"/>
+          <p:nvPr/>
+        </p:nvSpPr>
+        <p:spPr>
+          <a:xfrm>
+            <a:off x="6080760" y="1691639"/>
+            <a:ext cx="2286000" cy="365760"/>
+          </a:xfrm>
+          <a:prstGeom prst="rect">
+            <a:avLst/>
+          </a:prstGeom>
+          <a:noFill/>
+        </p:spPr>
+        <p:txBody>
+          <a:bodyPr wrap="square">
+            <a:spAutoFit/>
+          </a:bodyPr>
+          <a:lstStyle/>
+          <a:p>
+            <a:pPr algn="l">
+              <a:defRPr sz="1800" b="1">
+                <a:solidFill>
+                  <a:srgbClr val="003366"/>
+                </a:solidFill>
+                <a:latin typeface="Arial"/>
+              </a:defRPr>
+            </a:pPr>
+            <a:r>
+              <a:t>5.9</a:t>
+            </a:r>
+          </a:p>
+        </p:txBody>
+      </p:sp>
+      <p:sp>
+        <p:nvSpPr>
+          <p:cNvPr id="15" name="Rectangle 14"/>
+          <p:cNvSpPr/>
+          <p:nvPr/>
+        </p:nvSpPr>
+        <p:spPr>
+          <a:xfrm>
+            <a:off x="8686800" y="1280160"/>
+            <a:ext cx="2560320" cy="1097280"/>
+          </a:xfrm>
+          <a:prstGeom prst="rect">
+            <a:avLst/>
+          </a:prstGeom>
+          <a:solidFill>
+            <a:srgbClr val="F5F5F5"/>
+          </a:solidFill>
+          <a:ln>
+            <a:noFill/>
+          </a:ln>
+        </p:spPr>
+        <p:style>
+          <a:lnRef idx="1">
+            <a:schemeClr val="accent1"/>
+          </a:lnRef>
+          <a:fillRef idx="3">
+            <a:schemeClr val="accent1"/>
+          </a:fillRef>
+          <a:effectRef idx="2">
+            <a:schemeClr val="accent1"/>
+          </a:effectRef>
+          <a:fontRef idx="minor">
+            <a:schemeClr val="lt1"/>
+          </a:fontRef>
+        </p:style>
+        <p:txBody>
+          <a:bodyPr rtlCol="0" anchor="ctr"/>
+          <a:lstStyle/>
+          <a:p>
+            <a:pPr algn="ctr"/>
+          </a:p>
+        </p:txBody>
+      </p:sp>
+      <p:sp>
+        <p:nvSpPr>
+          <p:cNvPr id="16" name="TextBox 15"/>
+          <p:cNvSpPr txBox="1"/>
+          <p:nvPr/>
+        </p:nvSpPr>
+        <p:spPr>
+          <a:xfrm>
+            <a:off x="8823960" y="1371600"/>
+            <a:ext cx="2286000" cy="320040"/>
+          </a:xfrm>
+          <a:prstGeom prst="rect">
+            <a:avLst/>
+          </a:prstGeom>
+          <a:noFill/>
+        </p:spPr>
+        <p:txBody>
+          <a:bodyPr wrap="square">
+            <a:spAutoFit/>
+          </a:bodyPr>
+          <a:lstStyle/>
+          <a:p>
+            <a:pPr algn="l">
+              <a:defRPr sz="1000" b="0">
+                <a:solidFill>
+                  <a:srgbClr val="808080"/>
+                </a:solidFill>
+                <a:latin typeface="Arial"/>
+              </a:defRPr>
+            </a:pPr>
+            <a:r>
+              <a:t>Key Leaders</a:t>
+            </a:r>
+          </a:p>
+        </p:txBody>
+      </p:sp>
+      <p:sp>
+        <p:nvSpPr>
+          <p:cNvPr id="17" name="TextBox 16"/>
+          <p:cNvSpPr txBox="1"/>
+          <p:nvPr/>
+        </p:nvSpPr>
+        <p:spPr>
+          <a:xfrm>
+            <a:off x="8823960" y="1691639"/>
+            <a:ext cx="2286000" cy="365760"/>
+          </a:xfrm>
+          <a:prstGeom prst="rect">
+            <a:avLst/>
+          </a:prstGeom>
+          <a:noFill/>
+        </p:spPr>
+        <p:txBody>
+          <a:bodyPr wrap="square">
+            <a:spAutoFit/>
+          </a:bodyPr>
+          <a:lstStyle/>
+          <a:p>
+            <a:pPr algn="l">
+              <a:defRPr sz="1800" b="1">
+                <a:solidFill>
+                  <a:srgbClr val="003366"/>
+                </a:solidFill>
+                <a:latin typeface="Arial"/>
+              </a:defRPr>
+            </a:pPr>
+            <a:r>
+              <a:t>['Antonio Büchi (CEO)', 'Emilio Novoa (CFO)', 'Carlos Zenteno (CTO)']</a:t>
+            </a:r>
+          </a:p>
+        </p:txBody>
+      </p:sp>
+      <p:sp>
+        <p:nvSpPr>
+          <p:cNvPr id="18" name="TextBox 17"/>
+          <p:cNvSpPr txBox="1"/>
+          <p:nvPr/>
+        </p:nvSpPr>
+        <p:spPr>
+          <a:xfrm>
+            <a:off x="457200" y="2651760"/>
+            <a:ext cx="5029200" cy="274320"/>
+          </a:xfrm>
+          <a:prstGeom prst="rect">
+            <a:avLst/>
+          </a:prstGeom>
+          <a:noFill/>
+        </p:spPr>
+        <p:txBody>
+          <a:bodyPr wrap="square">
+            <a:spAutoFit/>
+          </a:bodyPr>
+          <a:lstStyle/>
+          <a:p>
+            <a:pPr algn="l">
+              <a:defRPr sz="1200" b="1">
+                <a:solidFill>
+                  <a:srgbClr val="003366"/>
+                </a:solidFill>
+                <a:latin typeface="Arial"/>
+              </a:defRPr>
+            </a:pPr>
+            <a:r>
+              <a:t>Organization Culture:</a:t>
+            </a:r>
+          </a:p>
+        </p:txBody>
+      </p:sp>
+      <p:sp>
+        <p:nvSpPr>
+          <p:cNvPr id="19" name="TextBox 18"/>
+          <p:cNvSpPr txBox="1"/>
+          <p:nvPr/>
+        </p:nvSpPr>
+        <p:spPr>
+          <a:xfrm>
+            <a:off x="457200" y="2971800"/>
+            <a:ext cx="5029200" cy="1097280"/>
+          </a:xfrm>
+          <a:prstGeom prst="rect">
+            <a:avLst/>
+          </a:prstGeom>
+          <a:noFill/>
+        </p:spPr>
+        <p:txBody>
+          <a:bodyPr wrap="square">
+            <a:spAutoFit/>
+          </a:bodyPr>
+          <a:lstStyle/>
+          <a:p>
+            <a:pPr algn="l">
+              <a:defRPr sz="1100" b="0">
+                <a:solidFill>
+                  <a:srgbClr val="333333"/>
+                </a:solidFill>
+                <a:latin typeface="Arial"/>
+              </a:defRPr>
+            </a:pPr>
+            <a:r>
+              <a:t>Stable leadership team (avg tenure &gt;3 years); Growth-oriented strategic posture; Innovation-led culture; strong engineering focus; premium brand DNA; long-tenured leadership team; Chilean market champion identity.</a:t>
+            </a:r>
+          </a:p>
+        </p:txBody>
+      </p:sp>
+      <p:pic>
+        <p:nvPicPr>
+          <p:cNvPr id="20" name="Picture 19" descr="talent_scores.png"/>
+          <p:cNvPicPr>
+            <a:picLocks noChangeAspect="1"/>
+          </p:cNvPicPr>
+          <p:nvPr/>
+        </p:nvPicPr>
+        <p:blipFill>
+          <a:blip r:embed="rId2"/>
+          <a:stretch>
+            <a:fillRect/>
+          </a:stretch>
+        </p:blipFill>
+        <p:spPr>
+          <a:xfrm>
+            <a:off x="5943600" y="2651760"/>
+            <a:ext cx="5486400" cy="2743200"/>
+          </a:xfrm>
+          <a:prstGeom prst="rect">
+            <a:avLst/>
+          </a:prstGeom>
+        </p:spPr>
+      </p:pic>
+      <p:sp>
+        <p:nvSpPr>
+          <p:cNvPr id="21" name="TextBox 20"/>
+          <p:cNvSpPr txBox="1"/>
+          <p:nvPr/>
+        </p:nvSpPr>
+        <p:spPr>
+          <a:xfrm>
+            <a:off x="457200" y="4572000"/>
+            <a:ext cx="10972800" cy="274320"/>
+          </a:xfrm>
+          <a:prstGeom prst="rect">
+            <a:avLst/>
+          </a:prstGeom>
+          <a:noFill/>
+        </p:spPr>
+        <p:txBody>
+          <a:bodyPr wrap="square">
+            <a:spAutoFit/>
+          </a:bodyPr>
+          <a:lstStyle/>
+          <a:p>
+            <a:pPr algn="l">
+              <a:defRPr sz="1200" b="1">
+                <a:solidFill>
+                  <a:srgbClr val="003366"/>
+                </a:solidFill>
+                <a:latin typeface="Arial"/>
+              </a:defRPr>
+            </a:pPr>
+            <a:r>
+              <a:t>Leadership Changes:</a:t>
+            </a:r>
+          </a:p>
+        </p:txBody>
+      </p:sp>
+      <p:sp>
+        <p:nvSpPr>
+          <p:cNvPr id="22" name="TextBox 21"/>
+          <p:cNvSpPr txBox="1"/>
+          <p:nvPr/>
+        </p:nvSpPr>
+        <p:spPr>
+          <a:xfrm>
+            <a:off x="457200" y="4846320"/>
+            <a:ext cx="10972800" cy="914400"/>
+          </a:xfrm>
+          <a:prstGeom prst="rect">
+            <a:avLst/>
+          </a:prstGeom>
+          <a:noFill/>
+        </p:spPr>
+        <p:txBody>
+          <a:bodyPr wrap="square">
+            <a:spAutoFit/>
+          </a:bodyPr>
+          <a:lstStyle/>
+          <a:p>
+            <a:pPr>
+              <a:spcAft>
+                <a:spcPts val="400"/>
+              </a:spcAft>
+              <a:defRPr sz="1100">
+                <a:solidFill>
+                  <a:srgbClr val="333333"/>
+                </a:solidFill>
+                <a:latin typeface="Arial"/>
+              </a:defRPr>
+            </a:pPr>
+            <a:r>
+              <a:t>• Antonio Büchi: (</a:t>
+            </a:r>
+          </a:p>
+          <a:p>
+            <a:pPr>
+              <a:spcAft>
+                <a:spcPts val="400"/>
+              </a:spcAft>
+              <a:defRPr sz="1100">
+                <a:solidFill>
+                  <a:srgbClr val="333333"/>
+                </a:solidFill>
+                <a:latin typeface="Arial"/>
+              </a:defRPr>
+            </a:pPr>
+            <a:r>
+              <a:t>• Emilio Novoa: (</a:t>
+            </a:r>
+          </a:p>
+          <a:p>
+            <a:pPr>
+              <a:spcAft>
+                <a:spcPts val="400"/>
+              </a:spcAft>
+              <a:defRPr sz="1100">
+                <a:solidFill>
+                  <a:srgbClr val="333333"/>
+                </a:solidFill>
+                <a:latin typeface="Arial"/>
+              </a:defRPr>
+            </a:pPr>
+            <a:r>
+              <a:t>• Carlos Zenteno: (</a:t>
+            </a:r>
+          </a:p>
+        </p:txBody>
+      </p:sp>
+      <p:sp>
+        <p:nvSpPr>
+          <p:cNvPr id="23" name="Rectangle 22"/>
+          <p:cNvSpPr/>
+          <p:nvPr/>
+        </p:nvSpPr>
+        <p:spPr>
+          <a:xfrm>
             <a:off x="457200" y="5760720"/>
             <a:ext cx="11277295" cy="685800"/>
           </a:xfrm>
@@ -20000,7 +20990,7 @@
       </p:sp>
       <p:sp>
         <p:nvSpPr>
-          <p:cNvPr id="10" name="TextBox 9"/>
+          <p:cNvPr id="24" name="TextBox 23"/>
           <p:cNvSpPr txBox="1"/>
           <p:nvPr/>
         </p:nvSpPr>
@@ -20506,7 +21496,54 @@
             <a:spAutoFit/>
           </a:bodyPr>
           <a:lstStyle/>
-          <a:p/>
+          <a:p>
+            <a:pPr>
+              <a:spcAft>
+                <a:spcPts val="400"/>
+              </a:spcAft>
+              <a:defRPr sz="1100">
+                <a:solidFill>
+                  <a:srgbClr val="333333"/>
+                </a:solidFill>
+                <a:latin typeface="Arial"/>
+              </a:defRPr>
+            </a:pPr>
+            <a:r>
+              <a:t>• 5G SA investment competing with established players: Capex pressure during 5G build-out phase (17-19% capex/revenue</a:t>
+            </a:r>
+          </a:p>
+          <a:p>
+            <a:pPr>
+              <a:spcAft>
+                <a:spcPts val="400"/>
+              </a:spcAft>
+              <a:defRPr sz="1100">
+                <a:solidFill>
+                  <a:srgbClr val="333333"/>
+                </a:solidFill>
+                <a:latin typeface="Arial"/>
+              </a:defRPr>
+            </a:pPr>
+            <a:r>
+              <a:t>• WOM's post-restructuring competitive aggression: ARPU pressure in price-sensitive segments</a:t>
+            </a:r>
+          </a:p>
+          <a:p>
+            <a:pPr>
+              <a:spcAft>
+                <a:spcPts val="400"/>
+              </a:spcAft>
+              <a:defRPr sz="1100">
+                <a:solidFill>
+                  <a:srgbClr val="333333"/>
+                </a:solidFill>
+                <a:latin typeface="Arial"/>
+              </a:defRPr>
+            </a:pPr>
+            <a:r>
+              <a:t>• Mining sector cyclicality affecting enterprise revenue: Enterprise segment (28% of revenue) exposed to commodity cycles</a:t>
+            </a:r>
+          </a:p>
         </p:txBody>
       </p:sp>
       <p:sp>
@@ -20583,7 +21620,7 @@
               </a:defRPr>
             </a:pPr>
             <a:r>
-              <a:t>Key Message: Ranked #1 of 5 operators in market; revenue CLP 811000.0M; EBITDA margin 30.0%; overall healthy operations; key strength: 5G Deployment; key challenge: Pricing Competitiveness; Management outlook: FY2025 total revenue CLP 2.1T (+4.2% YoY). EBITDA margin improved to 32.8% (+0.7pp). Management reaffirms FY2026 guidance: revenue growth 4-5%, EBITDA margin 33-34%. Capex/revenue expected at 16-18% as 5G build-out phase peaks.</a:t>
+              <a:t>Key Message: Ranked #1 of 5 operators in market; revenue CLP 811.0B; EBITDA margin 30.0%; overall healthy operations; key strength: 5G Deployment; key challenge: Pricing Competitiveness; Management outlook: FY2025 total revenue CLP 2.1T (+4.2% YoY). EBITDA margin improved to 32.8% (+0.7pp). Management reaffirms FY2026 guidance: revenue growth 4-5%, EBITDA margin 33-34%. Capex/revenue expected at 16-18% as 5G build-out phase peaks.</a:t>
             </a:r>
           </a:p>
         </p:txBody>
@@ -21276,7 +22313,7 @@
               </a:defRPr>
             </a:pPr>
             <a:r>
-              <a:t>Key Message: SWOT analysis identifies 17 strengths, 2 weaknesses, 21 opportunities, and 16 threats. The recommended strategic posture is offensive (SO-dominant).</a:t>
+              <a:t>Key Message: SWOT analysis identifies 17 strengths, 5 weaknesses, 18 opportunities, and 16 threats. The recommended strategic posture is offensive (SO-dominant).</a:t>
             </a:r>
           </a:p>
         </p:txBody>
@@ -21639,7 +22676,7 @@
               </a:defRPr>
             </a:pPr>
             <a:r>
-              <a:t>Chile telecom market totals CLP 1391000.0M in quarterly revenue; competitive strengths in Availability, Performance; Market presents a balanced mix of opportunities and challenges.</a:t>
+              <a:t>Chile telecom market totals CLP 1.39T in quarterly revenue; competitive strengths in Availability, Performance; Market presents a balanced mix of opportunities and challenges.</a:t>
             </a:r>
           </a:p>
         </p:txBody>
@@ -21869,7 +22906,7 @@
               </a:defRPr>
             </a:pPr>
             <a:r>
-              <a:t>Ranked #1 of 5 operators in market; revenue CLP 811000.0M; EBITDA margin 30.0%; overall healthy operations; key strength: 5G Deployment; key challenge: Pricing Competitiveness; Management outlook: FY2025 total revenue CLP 2.1T (+4.2% YoY). EBITDA margin improved to 32.8% (+0.7pp). Management reaffirms FY2026 guidance: revenue growth 4-5%, EBITDA margin 33-34%. Capex/revenue expected at 16-18% as 5G build-out phase peaks.</a:t>
+              <a:t>Ranked #1 of 5 operators in market; revenue CLP 811.0B; EBITDA margin 30.0%; overall healthy operations; key strength: 5G Deployment; key challenge: Pricing Competitiveness; Management outlook: FY2025 total revenue CLP 2.1T (+4.2% YoY). EBITDA margin improved to 32.8% (+0.7pp). Management reaffirms FY2026 guidance: revenue growth 4-5%, EBITDA margin 33-34%. Capex/revenue expected at 16-18% as 5G build-out phase peaks.</a:t>
             </a:r>
           </a:p>
         </p:txBody>
@@ -21984,7 +23021,7 @@
               </a:defRPr>
             </a:pPr>
             <a:r>
-              <a:t>SWOT analysis identifies 17 strengths, 2 weaknesses, 21 opportunities, and 16 threats. The recommended strategic posture is offensive (SO-dominant).</a:t>
+              <a:t>SWOT analysis identifies 17 strengths, 5 weaknesses, 18 opportunities, and 16 threats. The recommended strategic posture is offensive (SO-dominant).</a:t>
             </a:r>
           </a:p>
         </p:txBody>
@@ -22099,7 +23136,7 @@
               </a:defRPr>
             </a:pPr>
             <a:r>
-              <a:t>SPAN matrix positions 33 opportunities: 31 grow/invest, 2 acquire skills, 0 harvest, 0 avoid/exit. Focus resources on the 31 grow/invest items for maximum strategic impact.</a:t>
+              <a:t>SPAN matrix positions 48 opportunities: 36 grow/invest, 4 acquire skills, 4 harvest, 4 avoid/exit. Focus resources on the 36 grow/invest items for maximum strategic impact.</a:t>
             </a:r>
           </a:p>
         </p:txBody>
@@ -22583,7 +23620,7 @@
               </a:defRPr>
             </a:pPr>
             <a:r>
-              <a:t>Key Message: SPAN matrix positions 33 opportunities: 31 grow/invest, 2 acquire skills, 0 harvest, 0 avoid/exit. Focus resources on the 31 grow/invest items for maximum strategic impact.</a:t>
+              <a:t>Key Message: SPAN matrix positions 48 opportunities: 36 grow/invest, 4 acquire skills, 4 harvest, 4 avoid/exit. Focus resources on the 36 grow/invest items for maximum strategic impact.</a:t>
             </a:r>
           </a:p>
         </p:txBody>
@@ -22855,7 +23892,7 @@
               </a:defRPr>
             </a:pPr>
             <a:r>
-              <a:t>Key Message: SPAN matrix positions 33 opportunities: 31 grow/invest, 2 acquire skills, 0 harvest, 0 avoid/exit. Focus resources on the 31 grow/invest items for maximum strategic impact.</a:t>
+              <a:t>Key Message: SPAN matrix positions 48 opportunities: 36 grow/invest, 4 acquire skills, 4 harvest, 4 avoid/exit. Focus resources on the 36 grow/invest items for maximum strategic impact.</a:t>
             </a:r>
           </a:p>
         </p:txBody>
@@ -23714,7 +24751,7 @@
               </a:defRPr>
             </a:pPr>
             <a:r>
-              <a:t>Leverage 'Customer Service: score 80 (market avg 62)' to capture the opportunity of 'SUBTEL approves 700 MHz refarming for 5G rural broadband: Potential impact on entel_cl'.</a:t>
+              <a:t>Leverage 'Customer Service: score 80 (market avg 62)' to capture the opportunity of 'SUBTEL approves 700 MHz refarming for 5G rural broadband: SUBTEL approves 700 MHz refarming for 5G rural broadband: may create new market access or subsidy opportunities for entel_cl'.</a:t>
             </a:r>
           </a:p>
         </p:txBody>
@@ -23944,7 +24981,7 @@
               </a:defRPr>
             </a:pPr>
             <a:r>
-              <a:t>Leverage 'Digital Services: score 70 (market avg 66)' to capture the opportunity of 'SUBTEL mandates infrastructure sharing for 5G deployment in rural areas: Potential impact on entel_cl'.</a:t>
+              <a:t>Leverage 'Digital Services: score 70 (market avg 66)' to capture the opportunity of 'SUBTEL mandates infrastructure sharing for 5G deployment in rural areas: SUBTEL mandates infrastructure sharing for 5G deployment in rural areas: may create new market access or subsidy opportunities for entel_cl'.</a:t>
             </a:r>
           </a:p>
         </p:txBody>
@@ -24023,7 +25060,7 @@
               </a:defRPr>
             </a:pPr>
             <a:r>
-              <a:t>Key Message: SPAN matrix positions 33 opportunities: 31 grow/invest, 2 acquire skills, 0 harvest, 0 avoid/exit. Focus resources on the 31 grow/invest items for maximum strategic impact.</a:t>
+              <a:t>Key Message: SPAN matrix positions 48 opportunities: 36 grow/invest, 4 acquire skills, 4 harvest, 4 avoid/exit. Focus resources on the 36 grow/invest items for maximum strategic impact.</a:t>
             </a:r>
           </a:p>
         </p:txBody>
@@ -24422,7 +25459,7 @@
               </a:defRPr>
             </a:pPr>
             <a:r>
-              <a:t>Chile telecom market totals CLP 1391000.0M in quarterly revenue; competitive strengths in Availability, Performance; Market presents a balanced mix of opportunities and challenges.</a:t>
+              <a:t>Chile telecom market totals CLP 1.39T in quarterly revenue; competitive strengths in Availability, Performance; Market presents a balanced mix of opportunities and challenges.</a:t>
             </a:r>
           </a:p>
         </p:txBody>
@@ -24652,7 +25689,7 @@
               </a:defRPr>
             </a:pPr>
             <a:r>
-              <a:t>Ranked #1 of 5 operators in market; revenue CLP 811000.0M; EBITDA margin 30.0%; overall healthy operations; key strength: 5G Deployment; key challenge: Pricing Competitiveness; Management outlook: FY2025 total revenue CLP 2.1T (+4.2% YoY). EBITDA margin improved to 32.8% (+0.7pp). Management reaffirms FY2026 guidance: revenue growth 4-5%, EBITDA margin 33-34%. Capex/revenue expected at 16-18% as 5G build-out phase peaks.</a:t>
+              <a:t>Ranked #1 of 5 operators in market; revenue CLP 811.0B; EBITDA margin 30.0%; overall healthy operations; key strength: 5G Deployment; key challenge: Pricing Competitiveness; Management outlook: FY2025 total revenue CLP 2.1T (+4.2% YoY). EBITDA margin improved to 32.8% (+0.7pp). Management reaffirms FY2026 guidance: revenue growth 4-5%, EBITDA margin 33-34%. Capex/revenue expected at 16-18% as 5G build-out phase peaks.</a:t>
             </a:r>
           </a:p>
         </p:txBody>
@@ -24767,7 +25804,7 @@
               </a:defRPr>
             </a:pPr>
             <a:r>
-              <a:t>SWOT analysis identifies 17 strengths, 2 weaknesses, 21 opportunities, and 16 threats. The recommended strategic posture is offensive (SO-dominant).</a:t>
+              <a:t>SWOT analysis identifies 17 strengths, 5 weaknesses, 18 opportunities, and 16 threats. The recommended strategic posture is offensive (SO-dominant).</a:t>
             </a:r>
           </a:p>
         </p:txBody>
@@ -24882,7 +25919,7 @@
               </a:defRPr>
             </a:pPr>
             <a:r>
-              <a:t>SPAN matrix positions 33 opportunities: 31 grow/invest, 2 acquire skills, 0 harvest, 0 avoid/exit. Focus resources on the 31 grow/invest items for maximum strategic impact.</a:t>
+              <a:t>SPAN matrix positions 48 opportunities: 36 grow/invest, 4 acquire skills, 4 harvest, 4 avoid/exit. Focus resources on the 36 grow/invest items for maximum strategic impact.</a:t>
             </a:r>
           </a:p>
         </p:txBody>
@@ -25143,30 +26180,145 @@
         </p:nvSpPr>
         <p:spPr>
           <a:xfrm>
-            <a:off x="457200" y="1828800"/>
-            <a:ext cx="10972800" cy="914400"/>
-          </a:xfrm>
-          <a:prstGeom prst="rect">
-            <a:avLst/>
-          </a:prstGeom>
-          <a:noFill/>
-        </p:spPr>
-        <p:txBody>
-          <a:bodyPr wrap="square">
-            <a:spAutoFit/>
-          </a:bodyPr>
-          <a:lstStyle/>
-          <a:p>
-            <a:pPr algn="l">
-              <a:defRPr sz="1300" b="0">
-                <a:solidFill>
-                  <a:srgbClr val="808080"/>
-                </a:solidFill>
-                <a:latin typeface="Arial"/>
-              </a:defRPr>
-            </a:pPr>
-            <a:r>
-              <a:t>No provenance data recorded for this analysis</a:t>
+            <a:off x="457200" y="1280160"/>
+            <a:ext cx="10972800" cy="4114800"/>
+          </a:xfrm>
+          <a:prstGeom prst="rect">
+            <a:avLst/>
+          </a:prstGeom>
+          <a:noFill/>
+        </p:spPr>
+        <p:txBody>
+          <a:bodyPr wrap="square">
+            <a:spAutoFit/>
+          </a:bodyPr>
+          <a:lstStyle/>
+          <a:p>
+            <a:pPr>
+              <a:spcAft>
+                <a:spcPts val="400"/>
+              </a:spcAft>
+              <a:defRPr sz="1000">
+                <a:solidFill>
+                  <a:srgbClr val="333333"/>
+                </a:solidFill>
+                <a:latin typeface="Arial"/>
+              </a:defRPr>
+            </a:pPr>
+            <a:r>
+              <a:t>• telecom.db</a:t>
+            </a:r>
+          </a:p>
+          <a:p>
+            <a:pPr>
+              <a:spcAft>
+                <a:spcPts val="400"/>
+              </a:spcAft>
+              <a:defRPr sz="1000">
+                <a:solidFill>
+                  <a:srgbClr val="333333"/>
+                </a:solidFill>
+                <a:latin typeface="Arial"/>
+              </a:defRPr>
+            </a:pPr>
+            <a:r>
+              <a:t>• telecom.db</a:t>
+            </a:r>
+          </a:p>
+          <a:p>
+            <a:pPr>
+              <a:spcAft>
+                <a:spcPts val="400"/>
+              </a:spcAft>
+              <a:defRPr sz="1000">
+                <a:solidFill>
+                  <a:srgbClr val="333333"/>
+                </a:solidFill>
+                <a:latin typeface="Arial"/>
+              </a:defRPr>
+            </a:pPr>
+            <a:r>
+              <a:t>• telecom.db</a:t>
+            </a:r>
+          </a:p>
+          <a:p>
+            <a:pPr>
+              <a:spcAft>
+                <a:spcPts val="400"/>
+              </a:spcAft>
+              <a:defRPr sz="1000">
+                <a:solidFill>
+                  <a:srgbClr val="333333"/>
+                </a:solidFill>
+                <a:latin typeface="Arial"/>
+              </a:defRPr>
+            </a:pPr>
+            <a:r>
+              <a:t>• telecom.db</a:t>
+            </a:r>
+          </a:p>
+          <a:p>
+            <a:pPr>
+              <a:spcAft>
+                <a:spcPts val="400"/>
+              </a:spcAft>
+              <a:defRPr sz="1000">
+                <a:solidFill>
+                  <a:srgbClr val="333333"/>
+                </a:solidFill>
+                <a:latin typeface="Arial"/>
+              </a:defRPr>
+            </a:pPr>
+            <a:r>
+              <a:t>• telecom.db</a:t>
+            </a:r>
+          </a:p>
+          <a:p>
+            <a:pPr>
+              <a:spcAft>
+                <a:spcPts val="400"/>
+              </a:spcAft>
+              <a:defRPr sz="1000">
+                <a:solidFill>
+                  <a:srgbClr val="333333"/>
+                </a:solidFill>
+                <a:latin typeface="Arial"/>
+              </a:defRPr>
+            </a:pPr>
+            <a:r>
+              <a:t>• telecom.db</a:t>
+            </a:r>
+          </a:p>
+          <a:p>
+            <a:pPr>
+              <a:spcAft>
+                <a:spcPts val="400"/>
+              </a:spcAft>
+              <a:defRPr sz="1000">
+                <a:solidFill>
+                  <a:srgbClr val="333333"/>
+                </a:solidFill>
+                <a:latin typeface="Arial"/>
+              </a:defRPr>
+            </a:pPr>
+            <a:r>
+              <a:t>• telecom.db</a:t>
+            </a:r>
+          </a:p>
+          <a:p>
+            <a:pPr>
+              <a:spcAft>
+                <a:spcPts val="400"/>
+              </a:spcAft>
+              <a:defRPr sz="1000">
+                <a:solidFill>
+                  <a:srgbClr val="333333"/>
+                </a:solidFill>
+                <a:latin typeface="Arial"/>
+              </a:defRPr>
+            </a:pPr>
+            <a:r>
+              <a:t>• telecom.db</a:t>
             </a:r>
           </a:p>
         </p:txBody>
@@ -26067,7 +27219,7 @@
               </a:defRPr>
             </a:pPr>
             <a:r>
-              <a:t>CLP 1391.0B (quarterly, CQ4_2025</a:t>
+              <a:t>CLP 1.4T (quarterly, CQ4_2025</a:t>
             </a:r>
           </a:p>
         </p:txBody>

</xml_diff>